<commit_message>
Uploaded the PPT Slides with few changes.
</commit_message>
<xml_diff>
--- a/DevelopHers_Final.pptx
+++ b/DevelopHers_Final.pptx
@@ -13,10 +13,10 @@
     <p:sldId id="271" r:id="rId4"/>
     <p:sldId id="259" r:id="rId5"/>
     <p:sldId id="260" r:id="rId6"/>
-    <p:sldId id="266" r:id="rId7"/>
-    <p:sldId id="268" r:id="rId8"/>
-    <p:sldId id="265" r:id="rId9"/>
-    <p:sldId id="267" r:id="rId10"/>
+    <p:sldId id="275" r:id="rId7"/>
+    <p:sldId id="266" r:id="rId8"/>
+    <p:sldId id="267" r:id="rId9"/>
+    <p:sldId id="276" r:id="rId10"/>
     <p:sldId id="272" r:id="rId11"/>
     <p:sldId id="273" r:id="rId12"/>
     <p:sldId id="269" r:id="rId13"/>
@@ -122,6 +122,22 @@
       </a:defRPr>
     </a:lvl9pPr>
   </p:defaultTextStyle>
+  <p:extLst>
+    <p:ext uri="{EFAFB233-063F-42B5-8137-9DF3F51BA10A}">
+      <p15:sldGuideLst xmlns:p15="http://schemas.microsoft.com/office/powerpoint/2012/main">
+        <p15:guide id="1" orient="horz" pos="2160">
+          <p15:clr>
+            <a:srgbClr val="A4A3A4"/>
+          </p15:clr>
+        </p15:guide>
+        <p15:guide id="2" pos="2880">
+          <p15:clr>
+            <a:srgbClr val="A4A3A4"/>
+          </p15:clr>
+        </p15:guide>
+      </p15:sldGuideLst>
+    </p:ext>
+  </p:extLst>
 </p:presentation>
 </file>
 
@@ -207,7 +223,7 @@
           <a:p>
             <a:fld id="{087BE56E-A817-1C44-988F-BF6FA7DF8BA8}" type="datetimeFigureOut">
               <a:rPr lang="en-US" smtClean="0"/>
-              <a:t>20/07/16</a:t>
+              <a:t>7/21/2016</a:t>
             </a:fld>
             <a:endParaRPr lang="en-US"/>
           </a:p>
@@ -271,35 +287,35 @@
           <a:p>
             <a:pPr lvl="0"/>
             <a:r>
-              <a:rPr lang="en-GB" smtClean="0"/>
+              <a:rPr lang="en-GB"/>
               <a:t>Click to edit Master text styles</a:t>
             </a:r>
           </a:p>
           <a:p>
             <a:pPr lvl="1"/>
             <a:r>
-              <a:rPr lang="en-GB" smtClean="0"/>
+              <a:rPr lang="en-GB"/>
               <a:t>Second level</a:t>
             </a:r>
           </a:p>
           <a:p>
             <a:pPr lvl="2"/>
             <a:r>
-              <a:rPr lang="en-GB" smtClean="0"/>
+              <a:rPr lang="en-GB"/>
               <a:t>Third level</a:t>
             </a:r>
           </a:p>
           <a:p>
             <a:pPr lvl="3"/>
             <a:r>
-              <a:rPr lang="en-GB" smtClean="0"/>
+              <a:rPr lang="en-GB"/>
               <a:t>Fourth level</a:t>
             </a:r>
           </a:p>
           <a:p>
             <a:pPr lvl="4"/>
             <a:r>
-              <a:rPr lang="en-GB" smtClean="0"/>
+              <a:rPr lang="en-GB"/>
               <a:t>Fifth level</a:t>
             </a:r>
             <a:endParaRPr lang="en-US"/>
@@ -520,10 +536,9 @@
           <a:lstStyle/>
           <a:p>
             <a:r>
-              <a:rPr lang="en-US" dirty="0" smtClean="0"/>
+              <a:rPr lang="en-US" dirty="0"/>
               <a:t>Blog Demonstration</a:t>
             </a:r>
-            <a:endParaRPr lang="en-US" dirty="0"/>
           </a:p>
         </p:txBody>
       </p:sp>
@@ -601,7 +616,7 @@
           <a:lstStyle/>
           <a:p>
             <a:r>
-              <a:rPr lang="en-GB" smtClean="0"/>
+              <a:rPr lang="en-GB"/>
               <a:t>Click to edit Master title style</a:t>
             </a:r>
             <a:endParaRPr lang="en-US"/>
@@ -720,7 +735,7 @@
           </a:lstStyle>
           <a:p>
             <a:r>
-              <a:rPr lang="en-GB" smtClean="0"/>
+              <a:rPr lang="en-GB"/>
               <a:t>Click to edit Master subtitle style</a:t>
             </a:r>
             <a:endParaRPr lang="en-US"/>
@@ -744,7 +759,7 @@
           <a:p>
             <a:fld id="{3AC4EDBC-C091-7E44-B141-BE69CA6AC68D}" type="datetimeFigureOut">
               <a:rPr lang="en-US" smtClean="0"/>
-              <a:t>20/07/16</a:t>
+              <a:t>7/21/2016</a:t>
             </a:fld>
             <a:endParaRPr lang="en-US"/>
           </a:p>
@@ -838,7 +853,7 @@
           <a:lstStyle/>
           <a:p>
             <a:r>
-              <a:rPr lang="en-GB" smtClean="0"/>
+              <a:rPr lang="en-GB"/>
               <a:t>Click to edit Master title style</a:t>
             </a:r>
             <a:endParaRPr lang="en-US"/>
@@ -862,35 +877,35 @@
           <a:p>
             <a:pPr lvl="0"/>
             <a:r>
-              <a:rPr lang="en-GB" smtClean="0"/>
+              <a:rPr lang="en-GB"/>
               <a:t>Click to edit Master text styles</a:t>
             </a:r>
           </a:p>
           <a:p>
             <a:pPr lvl="1"/>
             <a:r>
-              <a:rPr lang="en-GB" smtClean="0"/>
+              <a:rPr lang="en-GB"/>
               <a:t>Second level</a:t>
             </a:r>
           </a:p>
           <a:p>
             <a:pPr lvl="2"/>
             <a:r>
-              <a:rPr lang="en-GB" smtClean="0"/>
+              <a:rPr lang="en-GB"/>
               <a:t>Third level</a:t>
             </a:r>
           </a:p>
           <a:p>
             <a:pPr lvl="3"/>
             <a:r>
-              <a:rPr lang="en-GB" smtClean="0"/>
+              <a:rPr lang="en-GB"/>
               <a:t>Fourth level</a:t>
             </a:r>
           </a:p>
           <a:p>
             <a:pPr lvl="4"/>
             <a:r>
-              <a:rPr lang="en-GB" smtClean="0"/>
+              <a:rPr lang="en-GB"/>
               <a:t>Fifth level</a:t>
             </a:r>
             <a:endParaRPr lang="en-US"/>
@@ -914,7 +929,7 @@
           <a:p>
             <a:fld id="{3AC4EDBC-C091-7E44-B141-BE69CA6AC68D}" type="datetimeFigureOut">
               <a:rPr lang="en-US" smtClean="0"/>
-              <a:t>20/07/16</a:t>
+              <a:t>7/21/2016</a:t>
             </a:fld>
             <a:endParaRPr lang="en-US"/>
           </a:p>
@@ -1013,7 +1028,7 @@
           <a:lstStyle/>
           <a:p>
             <a:r>
-              <a:rPr lang="en-GB" smtClean="0"/>
+              <a:rPr lang="en-GB"/>
               <a:t>Click to edit Master title style</a:t>
             </a:r>
             <a:endParaRPr lang="en-US"/>
@@ -1042,35 +1057,35 @@
           <a:p>
             <a:pPr lvl="0"/>
             <a:r>
-              <a:rPr lang="en-GB" smtClean="0"/>
+              <a:rPr lang="en-GB"/>
               <a:t>Click to edit Master text styles</a:t>
             </a:r>
           </a:p>
           <a:p>
             <a:pPr lvl="1"/>
             <a:r>
-              <a:rPr lang="en-GB" smtClean="0"/>
+              <a:rPr lang="en-GB"/>
               <a:t>Second level</a:t>
             </a:r>
           </a:p>
           <a:p>
             <a:pPr lvl="2"/>
             <a:r>
-              <a:rPr lang="en-GB" smtClean="0"/>
+              <a:rPr lang="en-GB"/>
               <a:t>Third level</a:t>
             </a:r>
           </a:p>
           <a:p>
             <a:pPr lvl="3"/>
             <a:r>
-              <a:rPr lang="en-GB" smtClean="0"/>
+              <a:rPr lang="en-GB"/>
               <a:t>Fourth level</a:t>
             </a:r>
           </a:p>
           <a:p>
             <a:pPr lvl="4"/>
             <a:r>
-              <a:rPr lang="en-GB" smtClean="0"/>
+              <a:rPr lang="en-GB"/>
               <a:t>Fifth level</a:t>
             </a:r>
             <a:endParaRPr lang="en-US"/>
@@ -1094,7 +1109,7 @@
           <a:p>
             <a:fld id="{3AC4EDBC-C091-7E44-B141-BE69CA6AC68D}" type="datetimeFigureOut">
               <a:rPr lang="en-US" smtClean="0"/>
-              <a:t>20/07/16</a:t>
+              <a:t>7/21/2016</a:t>
             </a:fld>
             <a:endParaRPr lang="en-US"/>
           </a:p>
@@ -1188,7 +1203,7 @@
           <a:lstStyle/>
           <a:p>
             <a:r>
-              <a:rPr lang="en-GB" smtClean="0"/>
+              <a:rPr lang="en-GB"/>
               <a:t>Click to edit Master title style</a:t>
             </a:r>
             <a:endParaRPr lang="en-US"/>
@@ -1212,35 +1227,35 @@
           <a:p>
             <a:pPr lvl="0"/>
             <a:r>
-              <a:rPr lang="en-GB" smtClean="0"/>
+              <a:rPr lang="en-GB"/>
               <a:t>Click to edit Master text styles</a:t>
             </a:r>
           </a:p>
           <a:p>
             <a:pPr lvl="1"/>
             <a:r>
-              <a:rPr lang="en-GB" smtClean="0"/>
+              <a:rPr lang="en-GB"/>
               <a:t>Second level</a:t>
             </a:r>
           </a:p>
           <a:p>
             <a:pPr lvl="2"/>
             <a:r>
-              <a:rPr lang="en-GB" smtClean="0"/>
+              <a:rPr lang="en-GB"/>
               <a:t>Third level</a:t>
             </a:r>
           </a:p>
           <a:p>
             <a:pPr lvl="3"/>
             <a:r>
-              <a:rPr lang="en-GB" smtClean="0"/>
+              <a:rPr lang="en-GB"/>
               <a:t>Fourth level</a:t>
             </a:r>
           </a:p>
           <a:p>
             <a:pPr lvl="4"/>
             <a:r>
-              <a:rPr lang="en-GB" smtClean="0"/>
+              <a:rPr lang="en-GB"/>
               <a:t>Fifth level</a:t>
             </a:r>
             <a:endParaRPr lang="en-US"/>
@@ -1264,7 +1279,7 @@
           <a:p>
             <a:fld id="{3AC4EDBC-C091-7E44-B141-BE69CA6AC68D}" type="datetimeFigureOut">
               <a:rPr lang="en-US" smtClean="0"/>
-              <a:t>20/07/16</a:t>
+              <a:t>7/21/2016</a:t>
             </a:fld>
             <a:endParaRPr lang="en-US"/>
           </a:p>
@@ -1367,7 +1382,7 @@
           </a:lstStyle>
           <a:p>
             <a:r>
-              <a:rPr lang="en-GB" smtClean="0"/>
+              <a:rPr lang="en-GB"/>
               <a:t>Click to edit Master title style</a:t>
             </a:r>
             <a:endParaRPr lang="en-US"/>
@@ -1487,7 +1502,7 @@
           <a:p>
             <a:pPr lvl="0"/>
             <a:r>
-              <a:rPr lang="en-GB" smtClean="0"/>
+              <a:rPr lang="en-GB"/>
               <a:t>Click to edit Master text styles</a:t>
             </a:r>
           </a:p>
@@ -1510,7 +1525,7 @@
           <a:p>
             <a:fld id="{3AC4EDBC-C091-7E44-B141-BE69CA6AC68D}" type="datetimeFigureOut">
               <a:rPr lang="en-US" smtClean="0"/>
-              <a:t>20/07/16</a:t>
+              <a:t>7/21/2016</a:t>
             </a:fld>
             <a:endParaRPr lang="en-US"/>
           </a:p>
@@ -1604,7 +1619,7 @@
           <a:lstStyle/>
           <a:p>
             <a:r>
-              <a:rPr lang="en-GB" smtClean="0"/>
+              <a:rPr lang="en-GB"/>
               <a:t>Click to edit Master title style</a:t>
             </a:r>
             <a:endParaRPr lang="en-US"/>
@@ -1661,35 +1676,35 @@
           <a:p>
             <a:pPr lvl="0"/>
             <a:r>
-              <a:rPr lang="en-GB" smtClean="0"/>
+              <a:rPr lang="en-GB"/>
               <a:t>Click to edit Master text styles</a:t>
             </a:r>
           </a:p>
           <a:p>
             <a:pPr lvl="1"/>
             <a:r>
-              <a:rPr lang="en-GB" smtClean="0"/>
+              <a:rPr lang="en-GB"/>
               <a:t>Second level</a:t>
             </a:r>
           </a:p>
           <a:p>
             <a:pPr lvl="2"/>
             <a:r>
-              <a:rPr lang="en-GB" smtClean="0"/>
+              <a:rPr lang="en-GB"/>
               <a:t>Third level</a:t>
             </a:r>
           </a:p>
           <a:p>
             <a:pPr lvl="3"/>
             <a:r>
-              <a:rPr lang="en-GB" smtClean="0"/>
+              <a:rPr lang="en-GB"/>
               <a:t>Fourth level</a:t>
             </a:r>
           </a:p>
           <a:p>
             <a:pPr lvl="4"/>
             <a:r>
-              <a:rPr lang="en-GB" smtClean="0"/>
+              <a:rPr lang="en-GB"/>
               <a:t>Fifth level</a:t>
             </a:r>
             <a:endParaRPr lang="en-US"/>
@@ -1746,35 +1761,35 @@
           <a:p>
             <a:pPr lvl="0"/>
             <a:r>
-              <a:rPr lang="en-GB" smtClean="0"/>
+              <a:rPr lang="en-GB"/>
               <a:t>Click to edit Master text styles</a:t>
             </a:r>
           </a:p>
           <a:p>
             <a:pPr lvl="1"/>
             <a:r>
-              <a:rPr lang="en-GB" smtClean="0"/>
+              <a:rPr lang="en-GB"/>
               <a:t>Second level</a:t>
             </a:r>
           </a:p>
           <a:p>
             <a:pPr lvl="2"/>
             <a:r>
-              <a:rPr lang="en-GB" smtClean="0"/>
+              <a:rPr lang="en-GB"/>
               <a:t>Third level</a:t>
             </a:r>
           </a:p>
           <a:p>
             <a:pPr lvl="3"/>
             <a:r>
-              <a:rPr lang="en-GB" smtClean="0"/>
+              <a:rPr lang="en-GB"/>
               <a:t>Fourth level</a:t>
             </a:r>
           </a:p>
           <a:p>
             <a:pPr lvl="4"/>
             <a:r>
-              <a:rPr lang="en-GB" smtClean="0"/>
+              <a:rPr lang="en-GB"/>
               <a:t>Fifth level</a:t>
             </a:r>
             <a:endParaRPr lang="en-US"/>
@@ -1798,7 +1813,7 @@
           <a:p>
             <a:fld id="{3AC4EDBC-C091-7E44-B141-BE69CA6AC68D}" type="datetimeFigureOut">
               <a:rPr lang="en-US" smtClean="0"/>
-              <a:t>20/07/16</a:t>
+              <a:t>7/21/2016</a:t>
             </a:fld>
             <a:endParaRPr lang="en-US"/>
           </a:p>
@@ -1896,7 +1911,7 @@
           </a:lstStyle>
           <a:p>
             <a:r>
-              <a:rPr lang="en-GB" smtClean="0"/>
+              <a:rPr lang="en-GB"/>
               <a:t>Click to edit Master title style</a:t>
             </a:r>
             <a:endParaRPr lang="en-US"/>
@@ -1962,7 +1977,7 @@
           <a:p>
             <a:pPr lvl="0"/>
             <a:r>
-              <a:rPr lang="en-GB" smtClean="0"/>
+              <a:rPr lang="en-GB"/>
               <a:t>Click to edit Master text styles</a:t>
             </a:r>
           </a:p>
@@ -2018,35 +2033,35 @@
           <a:p>
             <a:pPr lvl="0"/>
             <a:r>
-              <a:rPr lang="en-GB" smtClean="0"/>
+              <a:rPr lang="en-GB"/>
               <a:t>Click to edit Master text styles</a:t>
             </a:r>
           </a:p>
           <a:p>
             <a:pPr lvl="1"/>
             <a:r>
-              <a:rPr lang="en-GB" smtClean="0"/>
+              <a:rPr lang="en-GB"/>
               <a:t>Second level</a:t>
             </a:r>
           </a:p>
           <a:p>
             <a:pPr lvl="2"/>
             <a:r>
-              <a:rPr lang="en-GB" smtClean="0"/>
+              <a:rPr lang="en-GB"/>
               <a:t>Third level</a:t>
             </a:r>
           </a:p>
           <a:p>
             <a:pPr lvl="3"/>
             <a:r>
-              <a:rPr lang="en-GB" smtClean="0"/>
+              <a:rPr lang="en-GB"/>
               <a:t>Fourth level</a:t>
             </a:r>
           </a:p>
           <a:p>
             <a:pPr lvl="4"/>
             <a:r>
-              <a:rPr lang="en-GB" smtClean="0"/>
+              <a:rPr lang="en-GB"/>
               <a:t>Fifth level</a:t>
             </a:r>
             <a:endParaRPr lang="en-US"/>
@@ -2112,7 +2127,7 @@
           <a:p>
             <a:pPr lvl="0"/>
             <a:r>
-              <a:rPr lang="en-GB" smtClean="0"/>
+              <a:rPr lang="en-GB"/>
               <a:t>Click to edit Master text styles</a:t>
             </a:r>
           </a:p>
@@ -2168,35 +2183,35 @@
           <a:p>
             <a:pPr lvl="0"/>
             <a:r>
-              <a:rPr lang="en-GB" smtClean="0"/>
+              <a:rPr lang="en-GB"/>
               <a:t>Click to edit Master text styles</a:t>
             </a:r>
           </a:p>
           <a:p>
             <a:pPr lvl="1"/>
             <a:r>
-              <a:rPr lang="en-GB" smtClean="0"/>
+              <a:rPr lang="en-GB"/>
               <a:t>Second level</a:t>
             </a:r>
           </a:p>
           <a:p>
             <a:pPr lvl="2"/>
             <a:r>
-              <a:rPr lang="en-GB" smtClean="0"/>
+              <a:rPr lang="en-GB"/>
               <a:t>Third level</a:t>
             </a:r>
           </a:p>
           <a:p>
             <a:pPr lvl="3"/>
             <a:r>
-              <a:rPr lang="en-GB" smtClean="0"/>
+              <a:rPr lang="en-GB"/>
               <a:t>Fourth level</a:t>
             </a:r>
           </a:p>
           <a:p>
             <a:pPr lvl="4"/>
             <a:r>
-              <a:rPr lang="en-GB" smtClean="0"/>
+              <a:rPr lang="en-GB"/>
               <a:t>Fifth level</a:t>
             </a:r>
             <a:endParaRPr lang="en-US"/>
@@ -2220,7 +2235,7 @@
           <a:p>
             <a:fld id="{3AC4EDBC-C091-7E44-B141-BE69CA6AC68D}" type="datetimeFigureOut">
               <a:rPr lang="en-US" smtClean="0"/>
-              <a:t>20/07/16</a:t>
+              <a:t>7/21/2016</a:t>
             </a:fld>
             <a:endParaRPr lang="en-US"/>
           </a:p>
@@ -2314,7 +2329,7 @@
           <a:lstStyle/>
           <a:p>
             <a:r>
-              <a:rPr lang="en-GB" smtClean="0"/>
+              <a:rPr lang="en-GB"/>
               <a:t>Click to edit Master title style</a:t>
             </a:r>
             <a:endParaRPr lang="en-US"/>
@@ -2338,7 +2353,7 @@
           <a:p>
             <a:fld id="{3AC4EDBC-C091-7E44-B141-BE69CA6AC68D}" type="datetimeFigureOut">
               <a:rPr lang="en-US" smtClean="0"/>
-              <a:t>20/07/16</a:t>
+              <a:t>7/21/2016</a:t>
             </a:fld>
             <a:endParaRPr lang="en-US"/>
           </a:p>
@@ -2433,7 +2448,7 @@
           <a:p>
             <a:fld id="{3AC4EDBC-C091-7E44-B141-BE69CA6AC68D}" type="datetimeFigureOut">
               <a:rPr lang="en-US" smtClean="0"/>
-              <a:t>20/07/16</a:t>
+              <a:t>7/21/2016</a:t>
             </a:fld>
             <a:endParaRPr lang="en-US"/>
           </a:p>
@@ -2536,7 +2551,7 @@
           </a:lstStyle>
           <a:p>
             <a:r>
-              <a:rPr lang="en-GB" smtClean="0"/>
+              <a:rPr lang="en-GB"/>
               <a:t>Click to edit Master title style</a:t>
             </a:r>
             <a:endParaRPr lang="en-US"/>
@@ -2593,35 +2608,35 @@
           <a:p>
             <a:pPr lvl="0"/>
             <a:r>
-              <a:rPr lang="en-GB" smtClean="0"/>
+              <a:rPr lang="en-GB"/>
               <a:t>Click to edit Master text styles</a:t>
             </a:r>
           </a:p>
           <a:p>
             <a:pPr lvl="1"/>
             <a:r>
-              <a:rPr lang="en-GB" smtClean="0"/>
+              <a:rPr lang="en-GB"/>
               <a:t>Second level</a:t>
             </a:r>
           </a:p>
           <a:p>
             <a:pPr lvl="2"/>
             <a:r>
-              <a:rPr lang="en-GB" smtClean="0"/>
+              <a:rPr lang="en-GB"/>
               <a:t>Third level</a:t>
             </a:r>
           </a:p>
           <a:p>
             <a:pPr lvl="3"/>
             <a:r>
-              <a:rPr lang="en-GB" smtClean="0"/>
+              <a:rPr lang="en-GB"/>
               <a:t>Fourth level</a:t>
             </a:r>
           </a:p>
           <a:p>
             <a:pPr lvl="4"/>
             <a:r>
-              <a:rPr lang="en-GB" smtClean="0"/>
+              <a:rPr lang="en-GB"/>
               <a:t>Fifth level</a:t>
             </a:r>
             <a:endParaRPr lang="en-US"/>
@@ -2687,7 +2702,7 @@
           <a:p>
             <a:pPr lvl="0"/>
             <a:r>
-              <a:rPr lang="en-GB" smtClean="0"/>
+              <a:rPr lang="en-GB"/>
               <a:t>Click to edit Master text styles</a:t>
             </a:r>
           </a:p>
@@ -2710,7 +2725,7 @@
           <a:p>
             <a:fld id="{3AC4EDBC-C091-7E44-B141-BE69CA6AC68D}" type="datetimeFigureOut">
               <a:rPr lang="en-US" smtClean="0"/>
-              <a:t>20/07/16</a:t>
+              <a:t>7/21/2016</a:t>
             </a:fld>
             <a:endParaRPr lang="en-US"/>
           </a:p>
@@ -2813,7 +2828,7 @@
           </a:lstStyle>
           <a:p>
             <a:r>
-              <a:rPr lang="en-GB" smtClean="0"/>
+              <a:rPr lang="en-GB"/>
               <a:t>Click to edit Master title style</a:t>
             </a:r>
             <a:endParaRPr lang="en-US"/>
@@ -2940,7 +2955,7 @@
           <a:p>
             <a:pPr lvl="0"/>
             <a:r>
-              <a:rPr lang="en-GB" smtClean="0"/>
+              <a:rPr lang="en-GB"/>
               <a:t>Click to edit Master text styles</a:t>
             </a:r>
           </a:p>
@@ -2963,7 +2978,7 @@
           <a:p>
             <a:fld id="{3AC4EDBC-C091-7E44-B141-BE69CA6AC68D}" type="datetimeFigureOut">
               <a:rPr lang="en-US" smtClean="0"/>
-              <a:t>20/07/16</a:t>
+              <a:t>7/21/2016</a:t>
             </a:fld>
             <a:endParaRPr lang="en-US"/>
           </a:p>
@@ -3072,7 +3087,7 @@
           <a:lstStyle/>
           <a:p>
             <a:r>
-              <a:rPr lang="en-GB" smtClean="0"/>
+              <a:rPr lang="en-GB"/>
               <a:t>Click to edit Master title style</a:t>
             </a:r>
             <a:endParaRPr lang="en-US"/>
@@ -3106,35 +3121,35 @@
           <a:p>
             <a:pPr lvl="0"/>
             <a:r>
-              <a:rPr lang="en-GB" smtClean="0"/>
+              <a:rPr lang="en-GB"/>
               <a:t>Click to edit Master text styles</a:t>
             </a:r>
           </a:p>
           <a:p>
             <a:pPr lvl="1"/>
             <a:r>
-              <a:rPr lang="en-GB" smtClean="0"/>
+              <a:rPr lang="en-GB"/>
               <a:t>Second level</a:t>
             </a:r>
           </a:p>
           <a:p>
             <a:pPr lvl="2"/>
             <a:r>
-              <a:rPr lang="en-GB" smtClean="0"/>
+              <a:rPr lang="en-GB"/>
               <a:t>Third level</a:t>
             </a:r>
           </a:p>
           <a:p>
             <a:pPr lvl="3"/>
             <a:r>
-              <a:rPr lang="en-GB" smtClean="0"/>
+              <a:rPr lang="en-GB"/>
               <a:t>Fourth level</a:t>
             </a:r>
           </a:p>
           <a:p>
             <a:pPr lvl="4"/>
             <a:r>
-              <a:rPr lang="en-GB" smtClean="0"/>
+              <a:rPr lang="en-GB"/>
               <a:t>Fifth level</a:t>
             </a:r>
             <a:endParaRPr lang="en-US"/>
@@ -3176,7 +3191,7 @@
           <a:p>
             <a:fld id="{3AC4EDBC-C091-7E44-B141-BE69CA6AC68D}" type="datetimeFigureOut">
               <a:rPr lang="en-US" smtClean="0"/>
-              <a:t>20/07/16</a:t>
+              <a:t>7/21/2016</a:t>
             </a:fld>
             <a:endParaRPr lang="en-US"/>
           </a:p>
@@ -3578,7 +3593,7 @@
           <a:p>
             <a:pPr marL="7972"/>
             <a:r>
-              <a:rPr lang="en-GB" sz="3600" dirty="0" smtClean="0">
+              <a:rPr lang="en-GB" sz="3600" dirty="0">
                 <a:gradFill flip="none" rotWithShape="1">
                   <a:gsLst>
                     <a:gs pos="0">
@@ -3629,18 +3644,13 @@
           <a:lstStyle/>
           <a:p>
             <a:r>
-              <a:rPr lang="en-US" dirty="0" smtClean="0">
+              <a:rPr lang="en-US" dirty="0">
                 <a:solidFill>
                   <a:schemeClr val="accent1"/>
                 </a:solidFill>
               </a:rPr>
               <a:t>Group Project </a:t>
             </a:r>
-            <a:endParaRPr lang="en-US" dirty="0">
-              <a:solidFill>
-                <a:schemeClr val="accent1"/>
-              </a:solidFill>
-            </a:endParaRPr>
           </a:p>
         </p:txBody>
       </p:sp>
@@ -3683,13 +3693,6 @@
   <p:clrMapOvr>
     <a:masterClrMapping/>
   </p:clrMapOvr>
-  <p:timing>
-    <p:tnLst>
-      <p:par>
-        <p:cTn xmlns:p14="http://schemas.microsoft.com/office/powerpoint/2010/main" id="1" dur="indefinite" restart="never" nodeType="tmRoot"/>
-      </p:par>
-    </p:tnLst>
-  </p:timing>
 </p:sld>
 </file>
 
@@ -3760,57 +3763,57 @@
               <a:buNone/>
             </a:pPr>
             <a:r>
-              <a:rPr lang="en-GB" dirty="0" smtClean="0"/>
+              <a:rPr lang="en-GB" dirty="0"/>
               <a:t>Currently:</a:t>
             </a:r>
           </a:p>
           <a:p>
             <a:r>
-              <a:rPr lang="en-GB" dirty="0" smtClean="0"/>
+              <a:rPr lang="en-GB" dirty="0"/>
               <a:t>Validation and sanitisation of user input for login capability using trim(), </a:t>
             </a:r>
             <a:r>
-              <a:rPr lang="en-GB" dirty="0" err="1" smtClean="0"/>
+              <a:rPr lang="en-GB" dirty="0" err="1"/>
               <a:t>stripslashes</a:t>
             </a:r>
             <a:r>
-              <a:rPr lang="en-GB" dirty="0" smtClean="0"/>
+              <a:rPr lang="en-GB" dirty="0"/>
               <a:t>() and </a:t>
             </a:r>
             <a:r>
-              <a:rPr lang="en-GB" dirty="0" err="1" smtClean="0"/>
+              <a:rPr lang="en-GB" dirty="0" err="1"/>
               <a:t>htmlspecialchars</a:t>
             </a:r>
             <a:r>
-              <a:rPr lang="en-GB" dirty="0" smtClean="0"/>
+              <a:rPr lang="en-GB" dirty="0"/>
               <a:t>() – prevent injection</a:t>
             </a:r>
           </a:p>
           <a:p>
             <a:r>
-              <a:rPr lang="en-GB" dirty="0" smtClean="0"/>
+              <a:rPr lang="en-GB" dirty="0"/>
               <a:t>Passwords are hashed using PASSWORD_DEFAULT, i.e. Blowfish algorithm. Allows for additional algorithms in future. Random salt so each password has to be brute forced individually. </a:t>
             </a:r>
           </a:p>
           <a:p>
             <a:r>
-              <a:rPr lang="en-GB" dirty="0" smtClean="0"/>
+              <a:rPr lang="en-GB" dirty="0"/>
               <a:t>Login authenticated using </a:t>
             </a:r>
             <a:r>
-              <a:rPr lang="en-GB" dirty="0" err="1" smtClean="0"/>
+              <a:rPr lang="en-GB" dirty="0" err="1"/>
               <a:t>password_verify</a:t>
             </a:r>
             <a:r>
-              <a:rPr lang="en-GB" dirty="0" smtClean="0"/>
+              <a:rPr lang="en-GB" dirty="0"/>
               <a:t>, current cost parameter is 10, i.e. 2</a:t>
             </a:r>
             <a:r>
-              <a:rPr lang="en-GB" baseline="30000" dirty="0" smtClean="0"/>
+              <a:rPr lang="en-GB" baseline="30000" dirty="0"/>
               <a:t>10</a:t>
             </a:r>
             <a:r>
-              <a:rPr lang="en-GB" dirty="0" smtClean="0"/>
+              <a:rPr lang="en-GB" dirty="0"/>
               <a:t> iterations of hashing algorithm.</a:t>
             </a:r>
             <a:endParaRPr lang="en-GB" baseline="30000" dirty="0"/>
@@ -3835,7 +3838,7 @@
           <a:lstStyle/>
           <a:p>
             <a:r>
-              <a:rPr lang="en-GB" dirty="0" smtClean="0">
+              <a:rPr lang="en-GB" dirty="0">
                 <a:gradFill flip="none" rotWithShape="1">
                   <a:gsLst>
                     <a:gs pos="0">
@@ -3859,7 +3862,7 @@
               <a:t> </a:t>
             </a:r>
             <a:r>
-              <a:rPr lang="en-GB" sz="3600" dirty="0" smtClean="0">
+              <a:rPr lang="en-GB" sz="3600" dirty="0">
                 <a:gradFill flip="none" rotWithShape="1">
                   <a:gsLst>
                     <a:gs pos="0">
@@ -3896,13 +3899,6 @@
   <p:clrMapOvr>
     <a:masterClrMapping/>
   </p:clrMapOvr>
-  <p:timing>
-    <p:tnLst>
-      <p:par>
-        <p:cTn xmlns:p14="http://schemas.microsoft.com/office/powerpoint/2010/main" id="1" dur="indefinite" restart="never" nodeType="tmRoot"/>
-      </p:par>
-    </p:tnLst>
-  </p:timing>
 </p:sld>
 </file>
 
@@ -3973,37 +3969,37 @@
               <a:buNone/>
             </a:pPr>
             <a:r>
-              <a:rPr lang="en-GB" dirty="0" smtClean="0"/>
+              <a:rPr lang="en-GB" dirty="0"/>
               <a:t>Going forward:</a:t>
             </a:r>
           </a:p>
           <a:p>
             <a:r>
-              <a:rPr lang="en-GB" dirty="0" smtClean="0"/>
+              <a:rPr lang="en-GB" dirty="0"/>
               <a:t>Password_needs_rehash for best practice.</a:t>
             </a:r>
           </a:p>
           <a:p>
             <a:r>
-              <a:rPr lang="en-GB" dirty="0" smtClean="0"/>
+              <a:rPr lang="en-GB" dirty="0"/>
               <a:t>Increase cost parameter: more iterations but compromise on time (+1 cost = x2 time).</a:t>
             </a:r>
           </a:p>
           <a:p>
             <a:r>
-              <a:rPr lang="en-GB" dirty="0" smtClean="0"/>
+              <a:rPr lang="en-GB" dirty="0"/>
               <a:t>Secure contact us and subscribe forms – user input is not sanitised or validated. </a:t>
             </a:r>
           </a:p>
           <a:p>
             <a:r>
-              <a:rPr lang="en-GB" dirty="0" smtClean="0"/>
+              <a:rPr lang="en-GB" dirty="0"/>
               <a:t>Use different function than mail() as this is outdated and can be adapted to add recipients – used for simplicity.</a:t>
             </a:r>
           </a:p>
           <a:p>
             <a:r>
-              <a:rPr lang="en-GB" dirty="0" smtClean="0"/>
+              <a:rPr lang="en-GB" dirty="0"/>
               <a:t>Active conditions on password creation, i.e. number requirement, case etc. </a:t>
             </a:r>
           </a:p>
@@ -4030,7 +4026,7 @@
           <a:lstStyle/>
           <a:p>
             <a:r>
-              <a:rPr lang="en-GB" dirty="0" smtClean="0">
+              <a:rPr lang="en-GB" dirty="0">
                 <a:gradFill flip="none" rotWithShape="1">
                   <a:gsLst>
                     <a:gs pos="0">
@@ -4054,7 +4050,7 @@
               <a:t> </a:t>
             </a:r>
             <a:r>
-              <a:rPr lang="en-GB" sz="3600" dirty="0" smtClean="0">
+              <a:rPr lang="en-GB" sz="3600" dirty="0">
                 <a:gradFill flip="none" rotWithShape="1">
                   <a:gsLst>
                     <a:gs pos="0">
@@ -4091,13 +4087,6 @@
   <p:clrMapOvr>
     <a:masterClrMapping/>
   </p:clrMapOvr>
-  <p:timing>
-    <p:tnLst>
-      <p:par>
-        <p:cTn xmlns:p14="http://schemas.microsoft.com/office/powerpoint/2010/main" id="1" dur="indefinite" restart="never" nodeType="tmRoot"/>
-      </p:par>
-    </p:tnLst>
-  </p:timing>
 </p:sld>
 </file>
 
@@ -4170,7 +4159,7 @@
           <a:lstStyle/>
           <a:p>
             <a:r>
-              <a:rPr lang="en-GB" dirty="0" smtClean="0">
+              <a:rPr lang="en-GB" dirty="0">
                 <a:gradFill flip="none" rotWithShape="1">
                   <a:gsLst>
                     <a:gs pos="0">
@@ -4194,7 +4183,7 @@
               <a:t> </a:t>
             </a:r>
             <a:r>
-              <a:rPr lang="en-GB" sz="4000" dirty="0" smtClean="0">
+              <a:rPr lang="en-GB" sz="4000" dirty="0">
                 <a:gradFill flip="none" rotWithShape="1">
                   <a:gsLst>
                     <a:gs pos="0">
@@ -4231,7 +4220,7 @@
             <p:ph idx="1"/>
             <p:extLst>
               <p:ext uri="{D42A27DB-BD31-4B8C-83A1-F6EECF244321}">
-                <p14:modId xmlns:p14="http://schemas.microsoft.com/office/powerpoint/2010/main" val="1090652715"/>
+                <p14:modId xmlns:p14="http://schemas.microsoft.com/office/powerpoint/2010/main" val="106686066"/>
               </p:ext>
             </p:extLst>
           </p:nvPr>
@@ -4247,8 +4236,20 @@
                 <a:tableStyleId>{5C22544A-7EE6-4342-B048-85BDC9FD1C3A}</a:tableStyleId>
               </a:tblPr>
               <a:tblGrid>
-                <a:gridCol w="4248461"/>
-                <a:gridCol w="4248461"/>
+                <a:gridCol w="4248461">
+                  <a:extLst>
+                    <a:ext uri="{9D8B030D-6E8A-4147-A177-3AD203B41FA5}">
+                      <a16:colId xmlns:a16="http://schemas.microsoft.com/office/drawing/2014/main" val="20000"/>
+                    </a:ext>
+                  </a:extLst>
+                </a:gridCol>
+                <a:gridCol w="4248461">
+                  <a:extLst>
+                    <a:ext uri="{9D8B030D-6E8A-4147-A177-3AD203B41FA5}">
+                      <a16:colId xmlns:a16="http://schemas.microsoft.com/office/drawing/2014/main" val="20001"/>
+                    </a:ext>
+                  </a:extLst>
+                </a:gridCol>
               </a:tblGrid>
               <a:tr h="3183245">
                 <a:tc>
@@ -4274,7 +4275,7 @@
                         <a:defRPr/>
                       </a:pPr>
                       <a:r>
-                        <a:rPr lang="en-GB" dirty="0" smtClean="0"/>
+                        <a:rPr lang="en-GB" dirty="0"/>
                         <a:t>Connie </a:t>
                       </a:r>
                     </a:p>
@@ -4297,7 +4298,7 @@
                         <a:defRPr/>
                       </a:pPr>
                       <a:r>
-                        <a:rPr lang="en-US" sz="1600" b="0" dirty="0" smtClean="0"/>
+                        <a:rPr lang="en-US" sz="1600" b="0" dirty="0"/>
                         <a:t>Time constraints, letting people down, how much done in a time period.</a:t>
                       </a:r>
                     </a:p>
@@ -4320,8 +4321,8 @@
                         <a:defRPr/>
                       </a:pPr>
                       <a:r>
-                        <a:rPr lang="en-US" sz="1600" b="0" dirty="0" smtClean="0"/>
-                        <a:t>Taking apart other people’s code in order to add in other features e.g. data access object nad password hashing. </a:t>
+                        <a:rPr lang="en-US" sz="1600" b="0" dirty="0"/>
+                        <a:t>Taking apart other people’s code in order to add in other features e.g. data access object and password hashing. </a:t>
                       </a:r>
                     </a:p>
                     <a:p>
@@ -4342,7 +4343,7 @@
                         <a:tabLst/>
                         <a:defRPr/>
                       </a:pPr>
-                      <a:endParaRPr lang="en-GB" dirty="0" smtClean="0"/>
+                      <a:endParaRPr lang="en-GB" dirty="0"/>
                     </a:p>
                   </a:txBody>
                   <a:tcPr/>
@@ -4353,7 +4354,7 @@
                     <a:lstStyle/>
                     <a:p>
                       <a:r>
-                        <a:rPr lang="en-US" sz="1400" b="1" dirty="0" smtClean="0"/>
+                        <a:rPr lang="en-US" sz="1400" b="1" dirty="0"/>
                         <a:t>Katrina</a:t>
                       </a:r>
                     </a:p>
@@ -4363,7 +4364,7 @@
                         <a:buChar char="•"/>
                       </a:pPr>
                       <a:r>
-                        <a:rPr lang="en-GB" sz="1400" b="0" dirty="0" smtClean="0"/>
+                        <a:rPr lang="en-GB" sz="1400" b="0" dirty="0"/>
                         <a:t>Lack of technical knowledge </a:t>
                       </a:r>
                     </a:p>
@@ -4373,7 +4374,7 @@
                         <a:buChar char="§"/>
                       </a:pPr>
                       <a:r>
-                        <a:rPr lang="en-GB" sz="1400" b="0" dirty="0" smtClean="0"/>
+                        <a:rPr lang="en-GB" sz="1400" b="0" dirty="0"/>
                         <a:t>Zero previous experience of coding, website design, SCRUM…</a:t>
                       </a:r>
                     </a:p>
@@ -4383,7 +4384,7 @@
                         <a:buChar char="§"/>
                       </a:pPr>
                       <a:r>
-                        <a:rPr lang="en-GB" sz="1400" b="0" dirty="0" smtClean="0"/>
+                        <a:rPr lang="en-GB" sz="1400" b="0" dirty="0"/>
                         <a:t>Utilised a variety of sources: course materials, tutorials, forum posts, and other sources of information on the web</a:t>
                       </a:r>
                     </a:p>
@@ -4393,7 +4394,7 @@
                         <a:buChar char="§"/>
                       </a:pPr>
                       <a:r>
-                        <a:rPr lang="en-GB" sz="1400" b="0" dirty="0" smtClean="0"/>
+                        <a:rPr lang="en-GB" sz="1400" b="0" dirty="0"/>
                         <a:t>Trial and error!</a:t>
                       </a:r>
                     </a:p>
@@ -4402,11 +4403,11 @@
                         <a:buFont typeface="Wingdings" charset="2"/>
                         <a:buChar char="§"/>
                       </a:pPr>
-                      <a:endParaRPr lang="en-GB" sz="1400" b="0" dirty="0" smtClean="0"/>
+                      <a:endParaRPr lang="en-GB" sz="1400" b="0" dirty="0"/>
                     </a:p>
                     <a:p>
                       <a:r>
-                        <a:rPr lang="en-GB" sz="1400" b="0" dirty="0" smtClean="0"/>
+                        <a:rPr lang="en-GB" sz="1400" b="0" dirty="0"/>
                         <a:t>Communication</a:t>
                       </a:r>
                     </a:p>
@@ -4416,7 +4417,7 @@
                         <a:buChar char="•"/>
                       </a:pPr>
                       <a:r>
-                        <a:rPr lang="en-GB" sz="1400" b="0" dirty="0" smtClean="0"/>
+                        <a:rPr lang="en-GB" sz="1400" b="0" dirty="0"/>
                         <a:t>Division of labour</a:t>
                       </a:r>
                     </a:p>
@@ -4426,15 +4427,15 @@
                         <a:buChar char="•"/>
                       </a:pPr>
                       <a:r>
-                        <a:rPr lang="en-GB" sz="1400" b="0" dirty="0" smtClean="0"/>
+                        <a:rPr lang="en-GB" sz="1400" b="0" dirty="0"/>
                         <a:t>Keeping each other updated and involved.</a:t>
                       </a:r>
                       <a:r>
-                        <a:rPr lang="en-GB" sz="1400" b="0" baseline="0" dirty="0" smtClean="0"/>
+                        <a:rPr lang="en-GB" sz="1400" b="0" baseline="0" dirty="0"/>
                         <a:t> </a:t>
                       </a:r>
                       <a:r>
-                        <a:rPr lang="en-GB" sz="1400" b="0" dirty="0" smtClean="0"/>
+                        <a:rPr lang="en-GB" sz="1400" b="0" dirty="0"/>
                         <a:t>Primarily solved by using Hangouts and meeting weekly in person</a:t>
                       </a:r>
                     </a:p>
@@ -4448,6 +4449,11 @@
                   </a:txBody>
                   <a:tcPr/>
                 </a:tc>
+                <a:extLst>
+                  <a:ext uri="{0D108BD9-81ED-4DB2-BD59-A6C34878D82A}">
+                    <a16:rowId xmlns:a16="http://schemas.microsoft.com/office/drawing/2014/main" val="10000"/>
+                  </a:ext>
+                </a:extLst>
               </a:tr>
               <a:tr h="2297151">
                 <a:tc>
@@ -4456,11 +4462,11 @@
                     <a:lstStyle/>
                     <a:p>
                       <a:r>
-                        <a:rPr lang="en-US" sz="1600" b="1" dirty="0" smtClean="0"/>
+                        <a:rPr lang="en-US" sz="1600" b="1" dirty="0"/>
                         <a:t>Revathy</a:t>
                       </a:r>
                       <a:r>
-                        <a:rPr lang="en-US" sz="1600" b="0" dirty="0" smtClean="0"/>
+                        <a:rPr lang="en-US" sz="1600" b="0" dirty="0"/>
                         <a:t> </a:t>
                       </a:r>
                     </a:p>
@@ -4483,7 +4489,7 @@
                         <a:defRPr/>
                       </a:pPr>
                       <a:r>
-                        <a:rPr lang="en-GB" sz="1600" b="0" dirty="0" smtClean="0"/>
+                        <a:rPr lang="en-GB" sz="1600" b="0" dirty="0"/>
                         <a:t>I am new to PHP, so I had to learn a lot from various sources like sky course materials, forums, books etc. </a:t>
                       </a:r>
                     </a:p>
@@ -4506,7 +4512,7 @@
                         <a:defRPr/>
                       </a:pPr>
                       <a:r>
-                        <a:rPr lang="en-GB" sz="1600" b="0" dirty="0" smtClean="0"/>
+                        <a:rPr lang="en-GB" sz="1600" b="0" dirty="0"/>
                         <a:t>I had lot of ideas but due time constraints couldn’t implement all</a:t>
                       </a:r>
                     </a:p>
@@ -4522,7 +4528,7 @@
                     <a:lstStyle/>
                     <a:p>
                       <a:r>
-                        <a:rPr lang="en-US" b="1" dirty="0" smtClean="0"/>
+                        <a:rPr lang="en-US" b="1" dirty="0"/>
                         <a:t>Tisha</a:t>
                       </a:r>
                     </a:p>
@@ -4532,14 +4538,14 @@
                         <a:buChar char="•"/>
                       </a:pPr>
                       <a:r>
-                        <a:rPr lang="en-GB" sz="1500" b="0" dirty="0" smtClean="0"/>
+                        <a:rPr lang="en-GB" sz="1500" b="0" dirty="0"/>
                         <a:t>Lack</a:t>
                       </a:r>
                       <a:r>
-                        <a:rPr lang="en-GB" sz="1500" b="0" baseline="0" dirty="0" smtClean="0"/>
+                        <a:rPr lang="en-GB" sz="1500" b="0" baseline="0" dirty="0"/>
                         <a:t> of coding experience, trawling the internet and referring back to course materials for solutions and learning along the way </a:t>
                       </a:r>
-                      <a:endParaRPr lang="en-GB" sz="1500" b="0" dirty="0" smtClean="0"/>
+                      <a:endParaRPr lang="en-GB" sz="1500" b="0" dirty="0"/>
                     </a:p>
                     <a:p>
                       <a:pPr marL="285750" indent="-285750">
@@ -4547,11 +4553,11 @@
                         <a:buChar char="•"/>
                       </a:pPr>
                       <a:r>
-                        <a:rPr lang="en-GB" sz="1500" b="0" dirty="0" smtClean="0"/>
+                        <a:rPr lang="en-GB" sz="1500" b="0" dirty="0"/>
                         <a:t>Windows</a:t>
                       </a:r>
                       <a:r>
-                        <a:rPr lang="en-GB" sz="1500" b="0" baseline="0" dirty="0" smtClean="0"/>
+                        <a:rPr lang="en-GB" sz="1500" b="0" baseline="0" dirty="0"/>
                         <a:t> Vs Mac issues</a:t>
                       </a:r>
                     </a:p>
@@ -4561,7 +4567,7 @@
                         <a:buChar char="•"/>
                       </a:pPr>
                       <a:r>
-                        <a:rPr lang="en-GB" sz="1500" b="0" baseline="0" dirty="0" smtClean="0"/>
+                        <a:rPr lang="en-GB" sz="1500" b="0" baseline="0" dirty="0"/>
                         <a:t>Time constraints and worrying about not being able to figure problems out quick enough</a:t>
                       </a:r>
                     </a:p>
@@ -4571,14 +4577,19 @@
                         <a:buChar char="•"/>
                       </a:pPr>
                       <a:r>
-                        <a:rPr lang="en-GB" sz="1500" b="0" baseline="0" dirty="0" smtClean="0"/>
+                        <a:rPr lang="en-GB" sz="1500" b="0" baseline="0" dirty="0"/>
                         <a:t>Communication is the key</a:t>
                       </a:r>
-                      <a:endParaRPr lang="en-GB" sz="1500" b="0" dirty="0" smtClean="0"/>
+                      <a:endParaRPr lang="en-GB" sz="1500" b="0" dirty="0"/>
                     </a:p>
                   </a:txBody>
                   <a:tcPr/>
                 </a:tc>
+                <a:extLst>
+                  <a:ext uri="{0D108BD9-81ED-4DB2-BD59-A6C34878D82A}">
+                    <a16:rowId xmlns:a16="http://schemas.microsoft.com/office/drawing/2014/main" val="10001"/>
+                  </a:ext>
+                </a:extLst>
               </a:tr>
             </a:tbl>
           </a:graphicData>
@@ -4594,13 +4605,6 @@
   <p:clrMapOvr>
     <a:masterClrMapping/>
   </p:clrMapOvr>
-  <p:timing>
-    <p:tnLst>
-      <p:par>
-        <p:cTn xmlns:p14="http://schemas.microsoft.com/office/powerpoint/2010/main" id="1" dur="indefinite" restart="never" nodeType="tmRoot"/>
-      </p:par>
-    </p:tnLst>
-  </p:timing>
 </p:sld>
 </file>
 
@@ -4669,7 +4673,7 @@
           <a:lstStyle/>
           <a:p>
             <a:r>
-              <a:rPr lang="en-GB" sz="3600" dirty="0" smtClean="0">
+              <a:rPr lang="en-GB" sz="3600" dirty="0">
                 <a:gradFill flip="none" rotWithShape="1">
                   <a:gsLst>
                     <a:gs pos="0">
@@ -4690,55 +4694,7 @@
                 </a:gradFill>
                 <a:latin typeface="Sky Text"/>
               </a:rPr>
-              <a:t>Our </a:t>
-            </a:r>
-            <a:r>
-              <a:rPr lang="en-GB" sz="3600" dirty="0">
-                <a:gradFill flip="none" rotWithShape="1">
-                  <a:gsLst>
-                    <a:gs pos="0">
-                      <a:srgbClr val="F08300"/>
-                    </a:gs>
-                    <a:gs pos="100000">
-                      <a:srgbClr val="0644A1"/>
-                    </a:gs>
-                    <a:gs pos="36000">
-                      <a:srgbClr val="E30010"/>
-                    </a:gs>
-                    <a:gs pos="80000">
-                      <a:srgbClr val="A72879"/>
-                    </a:gs>
-                  </a:gsLst>
-                  <a:lin ang="0" scaled="1"/>
-                  <a:tileRect/>
-                </a:gradFill>
-                <a:latin typeface="Sky Text"/>
-              </a:rPr>
-              <a:t>B</a:t>
-            </a:r>
-            <a:r>
-              <a:rPr lang="en-GB" sz="3600" dirty="0" smtClean="0">
-                <a:gradFill flip="none" rotWithShape="1">
-                  <a:gsLst>
-                    <a:gs pos="0">
-                      <a:srgbClr val="F08300"/>
-                    </a:gs>
-                    <a:gs pos="100000">
-                      <a:srgbClr val="0644A1"/>
-                    </a:gs>
-                    <a:gs pos="36000">
-                      <a:srgbClr val="E30010"/>
-                    </a:gs>
-                    <a:gs pos="80000">
-                      <a:srgbClr val="A72879"/>
-                    </a:gs>
-                  </a:gsLst>
-                  <a:lin ang="0" scaled="1"/>
-                  <a:tileRect/>
-                </a:gradFill>
-                <a:latin typeface="Sky Text"/>
-              </a:rPr>
-              <a:t>log </a:t>
+              <a:t>Our Blog </a:t>
             </a:r>
             <a:endParaRPr lang="en-US" sz="3600" dirty="0"/>
           </a:p>
@@ -4765,88 +4721,26 @@
               <a:buNone/>
             </a:pPr>
             <a:r>
-              <a:rPr lang="en-US" sz="2400" dirty="0" smtClean="0"/>
-              <a:t>The </a:t>
-            </a:r>
-            <a:r>
-              <a:rPr lang="en-US" sz="2400" dirty="0" smtClean="0"/>
-              <a:t>idea behind</a:t>
-            </a:r>
-            <a:r>
-              <a:rPr lang="en-US" sz="2400" dirty="0" smtClean="0"/>
-              <a:t> our </a:t>
-            </a:r>
-            <a:r>
-              <a:rPr lang="en-US" sz="2400" dirty="0" smtClean="0"/>
-              <a:t>blog was to create a dedicated </a:t>
-            </a:r>
-            <a:r>
-              <a:rPr lang="en-US" sz="2400" dirty="0" smtClean="0"/>
-              <a:t>platform</a:t>
-            </a:r>
-            <a:r>
-              <a:rPr lang="en-US" sz="2400" dirty="0" smtClean="0"/>
-              <a:t> </a:t>
-            </a:r>
-            <a:r>
-              <a:rPr lang="en-US" sz="2400" dirty="0" smtClean="0"/>
-              <a:t>where people can </a:t>
-            </a:r>
-            <a:r>
-              <a:rPr lang="en-US" sz="2400" dirty="0" smtClean="0"/>
-              <a:t>read and post blogs</a:t>
-            </a:r>
-            <a:r>
-              <a:rPr lang="en-US" sz="2400" dirty="0" smtClean="0"/>
-              <a:t> about</a:t>
-            </a:r>
-            <a:r>
-              <a:rPr lang="en-US" sz="2400" dirty="0" smtClean="0"/>
-              <a:t> </a:t>
-            </a:r>
-            <a:r>
-              <a:rPr lang="en-US" sz="2400" dirty="0" smtClean="0"/>
-              <a:t>the wonderful, useful, </a:t>
-            </a:r>
-            <a:r>
-              <a:rPr lang="en-US" sz="2400" dirty="0" smtClean="0"/>
-              <a:t>or</a:t>
-            </a:r>
-            <a:r>
-              <a:rPr lang="en-US" sz="2400" dirty="0" smtClean="0"/>
-              <a:t> </a:t>
-            </a:r>
-            <a:r>
-              <a:rPr lang="en-US" sz="2400" dirty="0" smtClean="0"/>
-              <a:t>fun things people do on their lunch break in and around Sky.  </a:t>
-            </a:r>
-            <a:endParaRPr lang="en-US" sz="2400" dirty="0" smtClean="0"/>
+              <a:rPr lang="en-US" sz="2400" dirty="0"/>
+              <a:t>The idea behind our blog was to create a dedicated platform where people can read and post blogs about the wonderful, useful, or fun things people do on their lunch break in and around Sky.  </a:t>
+            </a:r>
           </a:p>
           <a:p>
             <a:pPr marL="0" indent="0">
               <a:buNone/>
             </a:pPr>
             <a:r>
-              <a:rPr lang="en-US" sz="2400" dirty="0" smtClean="0"/>
-              <a:t>A place to </a:t>
-            </a:r>
-            <a:r>
-              <a:rPr lang="en-US" sz="2400" dirty="0" smtClean="0"/>
-              <a:t>voice opinions </a:t>
-            </a:r>
-            <a:endParaRPr lang="en-US" sz="2400" dirty="0" smtClean="0"/>
+              <a:rPr lang="en-US" sz="2400" dirty="0"/>
+              <a:t>A place to voice opinions </a:t>
+            </a:r>
           </a:p>
           <a:p>
             <a:pPr marL="0" indent="0">
               <a:buNone/>
             </a:pPr>
             <a:r>
-              <a:rPr lang="en-US" sz="2400" dirty="0" smtClean="0"/>
-              <a:t>A place of </a:t>
-            </a:r>
-            <a:r>
-              <a:rPr lang="en-US" sz="2400" dirty="0" smtClean="0"/>
-              <a:t>discovery</a:t>
+              <a:rPr lang="en-US" sz="2400" dirty="0"/>
+              <a:t>A place of discovery</a:t>
             </a:r>
           </a:p>
           <a:p>
@@ -4854,14 +4748,9 @@
               <a:buNone/>
             </a:pPr>
             <a:r>
-              <a:rPr lang="en-US" sz="2400" dirty="0" smtClean="0"/>
-              <a:t>A place to make recommendations </a:t>
-            </a:r>
-            <a:r>
-              <a:rPr lang="en-US" sz="2400" dirty="0" smtClean="0"/>
-              <a:t> </a:t>
-            </a:r>
-            <a:endParaRPr lang="en-US" sz="2400" dirty="0"/>
+              <a:rPr lang="en-US" sz="2400" dirty="0"/>
+              <a:t>A place to make recommendations  </a:t>
+            </a:r>
           </a:p>
         </p:txBody>
       </p:sp>
@@ -4875,13 +4764,6 @@
   <p:clrMapOvr>
     <a:masterClrMapping/>
   </p:clrMapOvr>
-  <p:timing>
-    <p:tnLst>
-      <p:par>
-        <p:cTn xmlns:p14="http://schemas.microsoft.com/office/powerpoint/2010/main" id="1" dur="indefinite" restart="never" nodeType="tmRoot"/>
-      </p:par>
-    </p:tnLst>
-  </p:timing>
 </p:sld>
 </file>
 
@@ -4954,7 +4836,7 @@
           <a:lstStyle/>
           <a:p>
             <a:r>
-              <a:rPr lang="en-GB" dirty="0" smtClean="0">
+              <a:rPr lang="en-GB" dirty="0">
                 <a:gradFill flip="none" rotWithShape="1">
                   <a:gsLst>
                     <a:gs pos="0">
@@ -4978,7 +4860,7 @@
               <a:t> </a:t>
             </a:r>
             <a:r>
-              <a:rPr lang="en-GB" sz="3600" dirty="0" smtClean="0">
+              <a:rPr lang="en-GB" sz="3600" dirty="0">
                 <a:gradFill flip="none" rotWithShape="1">
                   <a:gsLst>
                     <a:gs pos="0">
@@ -5002,7 +4884,7 @@
               <a:t>Coming Soon</a:t>
             </a:r>
             <a:r>
-              <a:rPr lang="en-US" sz="3600" dirty="0" smtClean="0">
+              <a:rPr lang="en-US" sz="3600" dirty="0">
                 <a:gradFill flip="none" rotWithShape="1">
                   <a:gsLst>
                     <a:gs pos="0">
@@ -5148,7 +5030,7 @@
           <a:noFill/>
           <a:extLst>
             <a:ext uri="{909E8E84-426E-40dd-AFC4-6F175D3DCCD1}">
-              <a14:hiddenFill xmlns:a14="http://schemas.microsoft.com/office/drawing/2010/main">
+              <a14:hiddenFill xmlns="" xmlns:a14="http://schemas.microsoft.com/office/drawing/2010/main">
                 <a:solidFill>
                   <a:srgbClr val="FFFFFF"/>
                 </a:solidFill>
@@ -5267,13 +5149,6 @@
   <p:clrMapOvr>
     <a:masterClrMapping/>
   </p:clrMapOvr>
-  <p:timing>
-    <p:tnLst>
-      <p:par>
-        <p:cTn xmlns:p14="http://schemas.microsoft.com/office/powerpoint/2010/main" id="1" dur="indefinite" restart="never" nodeType="tmRoot"/>
-      </p:par>
-    </p:tnLst>
-  </p:timing>
 </p:sld>
 </file>
 
@@ -5346,7 +5221,7 @@
           <a:lstStyle/>
           <a:p>
             <a:r>
-              <a:rPr lang="en-GB" dirty="0" smtClean="0">
+              <a:rPr lang="en-GB" dirty="0">
                 <a:gradFill flip="none" rotWithShape="1">
                   <a:gsLst>
                     <a:gs pos="0">
@@ -5370,7 +5245,7 @@
               <a:t> </a:t>
             </a:r>
             <a:r>
-              <a:rPr lang="en-US" sz="3600" dirty="0" smtClean="0">
+              <a:rPr lang="en-US" sz="3600" dirty="0">
                 <a:gradFill flip="none" rotWithShape="1">
                   <a:gsLst>
                     <a:gs pos="0">
@@ -5391,7 +5266,7 @@
                 </a:gradFill>
                 <a:latin typeface="Sky Text"/>
               </a:rPr>
-              <a:t>…If only we had the the time! </a:t>
+              <a:t>…If only we had the time! </a:t>
             </a:r>
             <a:endParaRPr lang="en-US" sz="3600" dirty="0"/>
           </a:p>
@@ -5420,87 +5295,85 @@
           <a:lstStyle/>
           <a:p>
             <a:r>
-              <a:rPr lang="en-US" sz="2600" dirty="0" smtClean="0"/>
+              <a:rPr lang="en-US" sz="2600" dirty="0"/>
               <a:t>Adding video content to the site</a:t>
             </a:r>
           </a:p>
           <a:p>
             <a:pPr lvl="1"/>
             <a:r>
-              <a:rPr lang="en-GB" sz="2600" dirty="0" smtClean="0"/>
+              <a:rPr lang="en-GB" sz="2600" dirty="0"/>
               <a:t>Authorised users can embed video content with their blog posts using an upload form</a:t>
             </a:r>
           </a:p>
           <a:p>
             <a:pPr lvl="1"/>
             <a:r>
-              <a:rPr lang="en-GB" sz="2600" dirty="0" smtClean="0"/>
+              <a:rPr lang="en-GB" sz="2600" dirty="0"/>
               <a:t>Can contain tours, reviews, and travel segments to bring the content to life</a:t>
             </a:r>
           </a:p>
           <a:p>
             <a:pPr lvl="1"/>
             <a:r>
-              <a:rPr lang="en-GB" sz="2600" dirty="0" smtClean="0"/>
+              <a:rPr lang="en-GB" sz="2600" dirty="0"/>
               <a:t>Will be created using HTML5 and have JavaScript properties</a:t>
             </a:r>
-            <a:endParaRPr lang="en-US" sz="2600" dirty="0" smtClean="0"/>
-          </a:p>
-          <a:p>
-            <a:r>
-              <a:rPr lang="en-GB" sz="2600" dirty="0" smtClean="0"/>
+            <a:endParaRPr lang="en-US" sz="2600" dirty="0"/>
+          </a:p>
+          <a:p>
+            <a:r>
+              <a:rPr lang="en-GB" sz="2600" dirty="0"/>
               <a:t>Widgets showing popular categories</a:t>
             </a:r>
           </a:p>
           <a:p>
             <a:r>
-              <a:rPr lang="en-GB" sz="2600" dirty="0" smtClean="0"/>
+              <a:rPr lang="en-GB" sz="2600" dirty="0"/>
               <a:t>Sharing post in social media</a:t>
             </a:r>
           </a:p>
           <a:p>
             <a:r>
-              <a:rPr lang="en-GB" sz="2600" dirty="0" smtClean="0"/>
+              <a:rPr lang="en-GB" sz="2600" dirty="0"/>
               <a:t>Enable adding comments to posts </a:t>
             </a:r>
           </a:p>
           <a:p>
             <a:r>
-              <a:rPr lang="en-GB" sz="2600" dirty="0" smtClean="0"/>
+              <a:rPr lang="en-GB" sz="2600" dirty="0"/>
               <a:t>Linking to Google Maps for directions</a:t>
             </a:r>
           </a:p>
           <a:p>
             <a:r>
-              <a:rPr lang="en-GB" sz="2600" dirty="0" smtClean="0"/>
+              <a:rPr lang="en-GB" sz="2600" dirty="0"/>
               <a:t>Filtering by radius from your location</a:t>
             </a:r>
-            <a:endParaRPr lang="en-GB" sz="2600" dirty="0" smtClean="0"/>
-          </a:p>
-          <a:p>
-            <a:r>
-              <a:rPr lang="en-GB" sz="2600" dirty="0" smtClean="0"/>
+          </a:p>
+          <a:p>
+            <a:r>
+              <a:rPr lang="en-GB" sz="2600" dirty="0"/>
               <a:t>Calendar / functionality to schedule future events </a:t>
             </a:r>
           </a:p>
           <a:p>
             <a:r>
-              <a:rPr lang="en-GB" sz="2600" dirty="0" smtClean="0"/>
+              <a:rPr lang="en-GB" sz="2600" dirty="0"/>
               <a:t>The ability to rate/ like blog posts </a:t>
             </a:r>
           </a:p>
           <a:p>
             <a:r>
-              <a:rPr lang="en-GB" sz="2600" dirty="0" smtClean="0"/>
+              <a:rPr lang="en-GB" sz="2600" dirty="0"/>
               <a:t>Emoji (emoticons)</a:t>
             </a:r>
-            <a:endParaRPr lang="en-GB" sz="2600" dirty="0" smtClean="0"/>
           </a:p>
           <a:p>
             <a:pPr marL="0" indent="0">
               <a:buNone/>
             </a:pPr>
-            <a:endParaRPr lang="en-GB" sz="2000" dirty="0" smtClean="0"/>
+            <a:endParaRPr lang="en-GB" sz="2000" dirty="0"/>
           </a:p>
           <a:p>
             <a:pPr lvl="1"/>
@@ -5518,13 +5391,6 @@
   <p:clrMapOvr>
     <a:masterClrMapping/>
   </p:clrMapOvr>
-  <p:timing>
-    <p:tnLst>
-      <p:par>
-        <p:cTn xmlns:p14="http://schemas.microsoft.com/office/powerpoint/2010/main" id="1" dur="indefinite" restart="never" nodeType="tmRoot"/>
-      </p:par>
-    </p:tnLst>
-  </p:timing>
 </p:sld>
 </file>
 
@@ -5572,7 +5438,7 @@
           <a:p>
             <a:pPr marL="7972"/>
             <a:r>
-              <a:rPr lang="en-GB" sz="3600" dirty="0" smtClean="0">
+              <a:rPr lang="en-GB" sz="3600" dirty="0">
                 <a:gradFill flip="none" rotWithShape="1">
                   <a:gsLst>
                     <a:gs pos="0">
@@ -5669,13 +5535,6 @@
   <p:clrMapOvr>
     <a:masterClrMapping/>
   </p:clrMapOvr>
-  <p:timing>
-    <p:tnLst>
-      <p:par>
-        <p:cTn xmlns:p14="http://schemas.microsoft.com/office/powerpoint/2010/main" id="1" dur="indefinite" restart="never" nodeType="tmRoot"/>
-      </p:par>
-    </p:tnLst>
-  </p:timing>
 </p:sld>
 </file>
 
@@ -5809,13 +5668,6 @@
   <p:clrMapOvr>
     <a:masterClrMapping/>
   </p:clrMapOvr>
-  <p:timing>
-    <p:tnLst>
-      <p:par>
-        <p:cTn xmlns:p14="http://schemas.microsoft.com/office/powerpoint/2010/main" id="1" dur="indefinite" restart="never" nodeType="tmRoot"/>
-      </p:par>
-    </p:tnLst>
-  </p:timing>
 </p:sld>
 </file>
 
@@ -5854,7 +5706,7 @@
           <a:lstStyle/>
           <a:p>
             <a:r>
-              <a:rPr lang="en-GB" sz="3200" dirty="0" smtClean="0">
+              <a:rPr lang="en-GB" sz="3200" dirty="0">
                 <a:gradFill flip="none" rotWithShape="1">
                   <a:gsLst>
                     <a:gs pos="0">
@@ -5875,79 +5727,7 @@
                 </a:gradFill>
                 <a:latin typeface="Sky Text"/>
               </a:rPr>
-              <a:t>Teamwork Makes the Dream </a:t>
-            </a:r>
-            <a:r>
-              <a:rPr lang="en-GB" sz="3200" dirty="0">
-                <a:gradFill flip="none" rotWithShape="1">
-                  <a:gsLst>
-                    <a:gs pos="0">
-                      <a:srgbClr val="F08300"/>
-                    </a:gs>
-                    <a:gs pos="100000">
-                      <a:srgbClr val="0644A1"/>
-                    </a:gs>
-                    <a:gs pos="36000">
-                      <a:srgbClr val="E30010"/>
-                    </a:gs>
-                    <a:gs pos="80000">
-                      <a:srgbClr val="A72879"/>
-                    </a:gs>
-                  </a:gsLst>
-                  <a:lin ang="0" scaled="1"/>
-                  <a:tileRect/>
-                </a:gradFill>
-                <a:latin typeface="Sky Text"/>
-              </a:rPr>
-              <a:t>W</a:t>
-            </a:r>
-            <a:r>
-              <a:rPr lang="en-GB" sz="3200" dirty="0" smtClean="0">
-                <a:gradFill flip="none" rotWithShape="1">
-                  <a:gsLst>
-                    <a:gs pos="0">
-                      <a:srgbClr val="F08300"/>
-                    </a:gs>
-                    <a:gs pos="100000">
-                      <a:srgbClr val="0644A1"/>
-                    </a:gs>
-                    <a:gs pos="36000">
-                      <a:srgbClr val="E30010"/>
-                    </a:gs>
-                    <a:gs pos="80000">
-                      <a:srgbClr val="A72879"/>
-                    </a:gs>
-                  </a:gsLst>
-                  <a:lin ang="0" scaled="1"/>
-                  <a:tileRect/>
-                </a:gradFill>
-                <a:latin typeface="Sky Text"/>
-              </a:rPr>
-              <a:t>ork </a:t>
-            </a:r>
-            <a:r>
-              <a:rPr lang="en-GB" sz="3200" dirty="0" smtClean="0">
-                <a:gradFill flip="none" rotWithShape="1">
-                  <a:gsLst>
-                    <a:gs pos="0">
-                      <a:srgbClr val="F08300"/>
-                    </a:gs>
-                    <a:gs pos="100000">
-                      <a:srgbClr val="0644A1"/>
-                    </a:gs>
-                    <a:gs pos="36000">
-                      <a:srgbClr val="E30010"/>
-                    </a:gs>
-                    <a:gs pos="80000">
-                      <a:srgbClr val="A72879"/>
-                    </a:gs>
-                  </a:gsLst>
-                  <a:lin ang="0" scaled="1"/>
-                  <a:tileRect/>
-                </a:gradFill>
-                <a:latin typeface="Sky Text"/>
-              </a:rPr>
-              <a:t>  </a:t>
+              <a:t>Teamwork Makes the Dream Work   </a:t>
             </a:r>
             <a:endParaRPr lang="en-US" sz="3200" dirty="0"/>
           </a:p>
@@ -5973,7 +5753,7 @@
               <a:buChar char="•"/>
             </a:pPr>
             <a:r>
-              <a:rPr lang="en-US" dirty="0" smtClean="0"/>
+              <a:rPr lang="en-US" dirty="0"/>
               <a:t>Google Hangouts</a:t>
             </a:r>
           </a:p>
@@ -5983,7 +5763,7 @@
               <a:buChar char="•"/>
             </a:pPr>
             <a:r>
-              <a:rPr lang="en-US" dirty="0" smtClean="0"/>
+              <a:rPr lang="en-US" dirty="0"/>
               <a:t>JoinMe</a:t>
             </a:r>
           </a:p>
@@ -5993,7 +5773,7 @@
               <a:buChar char="•"/>
             </a:pPr>
             <a:r>
-              <a:rPr lang="en-US" dirty="0" smtClean="0"/>
+              <a:rPr lang="en-US" dirty="0"/>
               <a:t>Meeting up in person</a:t>
             </a:r>
           </a:p>
@@ -6044,13 +5824,6 @@
   <p:clrMapOvr>
     <a:masterClrMapping/>
   </p:clrMapOvr>
-  <p:timing>
-    <p:tnLst>
-      <p:par>
-        <p:cTn xmlns:p14="http://schemas.microsoft.com/office/powerpoint/2010/main" id="1" dur="indefinite" restart="never" nodeType="tmRoot"/>
-      </p:par>
-    </p:tnLst>
-  </p:timing>
 </p:sld>
 </file>
 
@@ -6118,7 +5891,7 @@
           <a:lstStyle/>
           <a:p>
             <a:r>
-              <a:rPr lang="en-GB" sz="3200" dirty="0" smtClean="0">
+              <a:rPr lang="en-GB" sz="3200" dirty="0">
                 <a:gradFill flip="none" rotWithShape="1">
                   <a:gsLst>
                     <a:gs pos="0">
@@ -6142,7 +5915,7 @@
               <a:t> </a:t>
             </a:r>
             <a:r>
-              <a:rPr lang="en-GB" sz="3600" dirty="0" smtClean="0">
+              <a:rPr lang="en-GB" sz="3600" dirty="0">
                 <a:gradFill flip="none" rotWithShape="1">
                   <a:gsLst>
                     <a:gs pos="0">
@@ -6166,7 +5939,7 @@
               <a:t>Software</a:t>
             </a:r>
             <a:r>
-              <a:rPr lang="en-GB" sz="3200" dirty="0" smtClean="0">
+              <a:rPr lang="en-GB" sz="3200" dirty="0">
                 <a:gradFill flip="none" rotWithShape="1">
                   <a:gsLst>
                     <a:gs pos="0">
@@ -6225,7 +5998,7 @@
           <a:noFill/>
           <a:extLst>
             <a:ext uri="{909E8E84-426E-40dd-AFC4-6F175D3DCCD1}">
-              <a14:hiddenFill xmlns:a14="http://schemas.microsoft.com/office/drawing/2010/main">
+              <a14:hiddenFill xmlns="" xmlns:a14="http://schemas.microsoft.com/office/drawing/2010/main">
                 <a:solidFill>
                   <a:srgbClr val="FFFFFF"/>
                 </a:solidFill>
@@ -6257,10 +6030,9 @@
           <a:lstStyle/>
           <a:p>
             <a:r>
-              <a:rPr lang="en-GB" dirty="0" smtClean="0"/>
+              <a:rPr lang="en-GB" dirty="0"/>
               <a:t>PHP, HTML, &amp; CSS</a:t>
             </a:r>
-            <a:endParaRPr lang="en-GB" dirty="0"/>
           </a:p>
         </p:txBody>
       </p:sp>
@@ -6296,7 +6068,7 @@
           <a:noFill/>
           <a:extLst>
             <a:ext uri="{909E8E84-426E-40dd-AFC4-6F175D3DCCD1}">
-              <a14:hiddenFill xmlns:a14="http://schemas.microsoft.com/office/drawing/2010/main">
+              <a14:hiddenFill xmlns="" xmlns:a14="http://schemas.microsoft.com/office/drawing/2010/main">
                 <a:solidFill>
                   <a:srgbClr val="FFFFFF"/>
                 </a:solidFill>
@@ -6328,7 +6100,7 @@
           <a:lstStyle/>
           <a:p>
             <a:r>
-              <a:rPr lang="en-GB" dirty="0" err="1" smtClean="0"/>
+              <a:rPr lang="en-GB" dirty="0" err="1"/>
               <a:t>mySQL</a:t>
             </a:r>
             <a:endParaRPr lang="en-GB" dirty="0"/>
@@ -6367,7 +6139,7 @@
           <a:noFill/>
           <a:extLst>
             <a:ext uri="{909E8E84-426E-40dd-AFC4-6F175D3DCCD1}">
-              <a14:hiddenFill xmlns:a14="http://schemas.microsoft.com/office/drawing/2010/main">
+              <a14:hiddenFill xmlns="" xmlns:a14="http://schemas.microsoft.com/office/drawing/2010/main">
                 <a:solidFill>
                   <a:srgbClr val="FFFFFF"/>
                 </a:solidFill>
@@ -6400,17 +6172,16 @@
           <a:p>
             <a:pPr algn="ctr"/>
             <a:r>
-              <a:rPr lang="en-GB" dirty="0" smtClean="0"/>
+              <a:rPr lang="en-GB" dirty="0"/>
               <a:t>Version control system</a:t>
             </a:r>
           </a:p>
           <a:p>
             <a:pPr algn="ctr"/>
             <a:r>
-              <a:rPr lang="en-GB" dirty="0" smtClean="0"/>
+              <a:rPr lang="en-GB" dirty="0"/>
               <a:t>&amp; repository</a:t>
             </a:r>
-            <a:endParaRPr lang="en-GB" dirty="0"/>
           </a:p>
         </p:txBody>
       </p:sp>
@@ -6424,13 +6195,6 @@
   <p:clrMapOvr>
     <a:masterClrMapping/>
   </p:clrMapOvr>
-  <p:timing>
-    <p:tnLst>
-      <p:par>
-        <p:cTn xmlns:p14="http://schemas.microsoft.com/office/powerpoint/2010/main" id="1" dur="indefinite" restart="never" nodeType="tmRoot"/>
-      </p:par>
-    </p:tnLst>
-  </p:timing>
 </p:sld>
 </file>
 
@@ -6498,7 +6262,7 @@
           <a:lstStyle/>
           <a:p>
             <a:r>
-              <a:rPr lang="en-GB" sz="3600" dirty="0" smtClean="0">
+              <a:rPr lang="en-GB" sz="3600" dirty="0">
                 <a:gradFill flip="none" rotWithShape="1">
                   <a:gsLst>
                     <a:gs pos="0">
@@ -6548,25 +6312,25 @@
           <a:lstStyle/>
           <a:p>
             <a:r>
-              <a:rPr lang="en-GB" sz="2600" dirty="0" smtClean="0"/>
+              <a:rPr lang="en-GB" sz="2600" dirty="0"/>
               <a:t>Adapted Agile SCRUM methodology</a:t>
             </a:r>
           </a:p>
           <a:p>
             <a:r>
-              <a:rPr lang="en-GB" sz="2600" dirty="0" smtClean="0"/>
+              <a:rPr lang="en-GB" sz="2600" dirty="0"/>
               <a:t>Initial planning session to create Project Backlog </a:t>
             </a:r>
           </a:p>
           <a:p>
             <a:r>
-              <a:rPr lang="en-GB" sz="2600" dirty="0" smtClean="0"/>
+              <a:rPr lang="en-GB" sz="2600" dirty="0"/>
               <a:t>3 sprints + sprint review meetings</a:t>
             </a:r>
           </a:p>
           <a:p>
             <a:r>
-              <a:rPr lang="en-GB" sz="2600" dirty="0" smtClean="0"/>
+              <a:rPr lang="en-GB" sz="2600" dirty="0"/>
               <a:t>Daily contact</a:t>
             </a:r>
           </a:p>
@@ -6574,11 +6338,11 @@
             <a:endParaRPr lang="en-GB" sz="2600" dirty="0"/>
           </a:p>
           <a:p>
-            <a:endParaRPr lang="en-GB" sz="2600" dirty="0" smtClean="0"/>
-          </a:p>
-          <a:p>
-            <a:r>
-              <a:rPr lang="en-GB" sz="2600" dirty="0" smtClean="0">
+            <a:endParaRPr lang="en-GB" sz="2600" dirty="0"/>
+          </a:p>
+          <a:p>
+            <a:r>
+              <a:rPr lang="en-GB" sz="2600" dirty="0">
                 <a:solidFill>
                   <a:schemeClr val="tx1"/>
                 </a:solidFill>
@@ -6586,7 +6350,7 @@
               <a:t>For task management during sprints, we used </a:t>
             </a:r>
             <a:r>
-              <a:rPr lang="en-GB" sz="2600" dirty="0" err="1" smtClean="0">
+              <a:rPr lang="en-GB" sz="2600" dirty="0" err="1">
                 <a:solidFill>
                   <a:schemeClr val="tx1"/>
                 </a:solidFill>
@@ -6594,7 +6358,7 @@
               <a:t>Trello</a:t>
             </a:r>
             <a:r>
-              <a:rPr lang="en-GB" sz="2600" dirty="0" smtClean="0">
+              <a:rPr lang="en-GB" sz="2600" dirty="0">
                 <a:solidFill>
                   <a:schemeClr val="tx1"/>
                 </a:solidFill>
@@ -6605,7 +6369,7 @@
           <a:p>
             <a:pPr lvl="1"/>
             <a:r>
-              <a:rPr lang="en-GB" sz="2600" dirty="0" smtClean="0">
+              <a:rPr lang="en-GB" sz="2600" dirty="0">
                 <a:solidFill>
                   <a:schemeClr val="tx1"/>
                 </a:solidFill>
@@ -6616,7 +6380,7 @@
           <a:p>
             <a:pPr lvl="1"/>
             <a:r>
-              <a:rPr lang="en-GB" sz="2600" dirty="0" smtClean="0">
+              <a:rPr lang="en-GB" sz="2600" dirty="0">
                 <a:solidFill>
                   <a:schemeClr val="tx1"/>
                 </a:solidFill>
@@ -6627,7 +6391,7 @@
           <a:p>
             <a:pPr lvl="1"/>
             <a:r>
-              <a:rPr lang="en-GB" sz="2600" dirty="0" smtClean="0">
+              <a:rPr lang="en-GB" sz="2600" dirty="0">
                 <a:solidFill>
                   <a:schemeClr val="tx1"/>
                 </a:solidFill>
@@ -6638,7 +6402,7 @@
           <a:p>
             <a:pPr lvl="1"/>
             <a:r>
-              <a:rPr lang="en-GB" sz="2600" dirty="0" smtClean="0">
+              <a:rPr lang="en-GB" sz="2600" dirty="0">
                 <a:solidFill>
                   <a:schemeClr val="tx1"/>
                 </a:solidFill>
@@ -6649,7 +6413,7 @@
           <a:p>
             <a:pPr lvl="1"/>
             <a:r>
-              <a:rPr lang="en-GB" sz="2600" dirty="0" smtClean="0">
+              <a:rPr lang="en-GB" sz="2600" dirty="0">
                 <a:solidFill>
                   <a:schemeClr val="tx1"/>
                 </a:solidFill>
@@ -6694,7 +6458,7 @@
           <a:noFill/>
           <a:extLst>
             <a:ext uri="{909E8E84-426E-40dd-AFC4-6F175D3DCCD1}">
-              <a14:hiddenFill xmlns:a14="http://schemas.microsoft.com/office/drawing/2010/main">
+              <a14:hiddenFill xmlns="" xmlns:a14="http://schemas.microsoft.com/office/drawing/2010/main">
                 <a:solidFill>
                   <a:srgbClr val="FFFFFF"/>
                 </a:solidFill>
@@ -6870,14 +6634,14 @@
           <a:effectLst/>
           <a:extLst>
             <a:ext uri="{909E8E84-426E-40dd-AFC4-6F175D3DCCD1}">
-              <a14:hiddenFill xmlns:a14="http://schemas.microsoft.com/office/drawing/2010/main">
+              <a14:hiddenFill xmlns="" xmlns:a14="http://schemas.microsoft.com/office/drawing/2010/main">
                 <a:solidFill>
                   <a:schemeClr val="accent1"/>
                 </a:solidFill>
               </a14:hiddenFill>
             </a:ext>
             <a:ext uri="{91240B29-F687-4f45-9708-019B960494DF}">
-              <a14:hiddenLine xmlns:a14="http://schemas.microsoft.com/office/drawing/2010/main" w="9525">
+              <a14:hiddenLine xmlns="" xmlns:a14="http://schemas.microsoft.com/office/drawing/2010/main" w="9525">
                 <a:solidFill>
                   <a:schemeClr val="tx1"/>
                 </a:solidFill>
@@ -6887,7 +6651,7 @@
               </a14:hiddenLine>
             </a:ext>
             <a:ext uri="{AF507438-7753-43e0-B8FC-AC1667EBCBE1}">
-              <a14:hiddenEffects xmlns:a14="http://schemas.microsoft.com/office/drawing/2010/main">
+              <a14:hiddenEffects xmlns="" xmlns:a14="http://schemas.microsoft.com/office/drawing/2010/main">
                 <a:effectLst>
                   <a:outerShdw dist="35921" dir="2700000" algn="ctr" rotWithShape="0">
                     <a:schemeClr val="bg2"/>
@@ -6908,13 +6672,6 @@
   <p:clrMapOvr>
     <a:masterClrMapping/>
   </p:clrMapOvr>
-  <p:timing>
-    <p:tnLst>
-      <p:par>
-        <p:cTn xmlns:p14="http://schemas.microsoft.com/office/powerpoint/2010/main" id="1" dur="indefinite" restart="never" nodeType="tmRoot"/>
-      </p:par>
-    </p:tnLst>
-  </p:timing>
 </p:sld>
 </file>
 
@@ -6974,344 +6731,6 @@
             <p:ph type="title"/>
           </p:nvPr>
         </p:nvSpPr>
-        <p:spPr/>
-        <p:txBody>
-          <a:bodyPr>
-            <a:normAutofit/>
-          </a:bodyPr>
-          <a:lstStyle/>
-          <a:p>
-            <a:r>
-              <a:rPr lang="en-GB" sz="3600" dirty="0" smtClean="0">
-                <a:gradFill flip="none" rotWithShape="1">
-                  <a:gsLst>
-                    <a:gs pos="0">
-                      <a:srgbClr val="F08300"/>
-                    </a:gs>
-                    <a:gs pos="100000">
-                      <a:srgbClr val="0644A1"/>
-                    </a:gs>
-                    <a:gs pos="36000">
-                      <a:srgbClr val="E30010"/>
-                    </a:gs>
-                    <a:gs pos="80000">
-                      <a:srgbClr val="A72879"/>
-                    </a:gs>
-                  </a:gsLst>
-                  <a:lin ang="0" scaled="1"/>
-                  <a:tileRect/>
-                </a:gradFill>
-                <a:latin typeface="Sky Text"/>
-              </a:rPr>
-              <a:t>Project Prototype</a:t>
-            </a:r>
-            <a:endParaRPr lang="en-US" sz="3600" dirty="0"/>
-          </a:p>
-        </p:txBody>
-      </p:sp>
-      <p:sp>
-        <p:nvSpPr>
-          <p:cNvPr id="2" name="Content Placeholder 1"/>
-          <p:cNvSpPr>
-            <a:spLocks noGrp="1"/>
-          </p:cNvSpPr>
-          <p:nvPr>
-            <p:ph idx="1"/>
-          </p:nvPr>
-        </p:nvSpPr>
-        <p:spPr>
-          <a:xfrm>
-            <a:off x="457200" y="1417638"/>
-            <a:ext cx="8229600" cy="5377609"/>
-          </a:xfrm>
-        </p:spPr>
-        <p:txBody>
-          <a:bodyPr>
-            <a:normAutofit/>
-          </a:bodyPr>
-          <a:lstStyle/>
-          <a:p>
-            <a:pPr marL="0" indent="0">
-              <a:buNone/>
-            </a:pPr>
-            <a:r>
-              <a:rPr lang="en-GB" dirty="0"/>
-              <a:t>Before starting our project , we designed a </a:t>
-            </a:r>
-            <a:r>
-              <a:rPr lang="en-GB" dirty="0">
-                <a:hlinkClick r:id="rId3" action="ppaction://hlinkfile"/>
-              </a:rPr>
-              <a:t>prototype</a:t>
-            </a:r>
-            <a:r>
-              <a:rPr lang="en-GB" dirty="0"/>
-              <a:t> to </a:t>
-            </a:r>
-          </a:p>
-          <a:p>
-            <a:r>
-              <a:rPr lang="en-GB" dirty="0"/>
-              <a:t>Understand the requirements </a:t>
-            </a:r>
-          </a:p>
-          <a:p>
-            <a:r>
-              <a:rPr lang="en-GB" dirty="0"/>
-              <a:t>Technically understand the problem</a:t>
-            </a:r>
-          </a:p>
-          <a:p>
-            <a:r>
-              <a:rPr lang="en-GB" dirty="0"/>
-              <a:t>Find design issues early</a:t>
-            </a:r>
-          </a:p>
-          <a:p>
-            <a:r>
-              <a:rPr lang="en-GB" dirty="0"/>
-              <a:t>Set our design priorities </a:t>
-            </a:r>
-          </a:p>
-          <a:p>
-            <a:r>
-              <a:rPr lang="en-GB" dirty="0"/>
-              <a:t>Site Navigation</a:t>
-            </a:r>
-          </a:p>
-          <a:p>
-            <a:endParaRPr lang="en-GB" dirty="0"/>
-          </a:p>
-        </p:txBody>
-      </p:sp>
-    </p:spTree>
-    <p:extLst>
-      <p:ext uri="{BB962C8B-B14F-4D97-AF65-F5344CB8AC3E}">
-        <p14:creationId xmlns:p14="http://schemas.microsoft.com/office/powerpoint/2010/main" val="3718095326"/>
-      </p:ext>
-    </p:extLst>
-  </p:cSld>
-  <p:clrMapOvr>
-    <a:masterClrMapping/>
-  </p:clrMapOvr>
-  <p:timing>
-    <p:tnLst>
-      <p:par>
-        <p:cTn xmlns:p14="http://schemas.microsoft.com/office/powerpoint/2010/main" id="1" dur="indefinite" restart="never" nodeType="tmRoot"/>
-      </p:par>
-    </p:tnLst>
-  </p:timing>
-</p:sld>
-</file>
-
-<file path=ppt/slides/slide7.xml><?xml version="1.0" encoding="utf-8"?>
-<p:sld xmlns:a="http://schemas.openxmlformats.org/drawingml/2006/main" xmlns:r="http://schemas.openxmlformats.org/officeDocument/2006/relationships" xmlns:p="http://schemas.openxmlformats.org/presentationml/2006/main">
-  <p:cSld>
-    <p:spTree>
-      <p:nvGrpSpPr>
-        <p:cNvPr id="1" name=""/>
-        <p:cNvGrpSpPr/>
-        <p:nvPr/>
-      </p:nvGrpSpPr>
-      <p:grpSpPr>
-        <a:xfrm>
-          <a:off x="0" y="0"/>
-          <a:ext cx="0" cy="0"/>
-          <a:chOff x="0" y="0"/>
-          <a:chExt cx="0" cy="0"/>
-        </a:xfrm>
-      </p:grpSpPr>
-      <p:sp>
-        <p:nvSpPr>
-          <p:cNvPr id="4" name="object 6"/>
-          <p:cNvSpPr/>
-          <p:nvPr/>
-        </p:nvSpPr>
-        <p:spPr>
-          <a:xfrm>
-            <a:off x="0" y="5076717"/>
-            <a:ext cx="8630275" cy="1781283"/>
-          </a:xfrm>
-          <a:prstGeom prst="rect">
-            <a:avLst/>
-          </a:prstGeom>
-          <a:blipFill>
-            <a:blip r:embed="rId2" cstate="print"/>
-            <a:stretch>
-              <a:fillRect/>
-            </a:stretch>
-          </a:blipFill>
-        </p:spPr>
-        <p:txBody>
-          <a:bodyPr wrap="square" lIns="0" tIns="0" rIns="0" bIns="0" rtlCol="0"/>
-          <a:lstStyle/>
-          <a:p>
-            <a:endParaRPr kern="1200"/>
-          </a:p>
-        </p:txBody>
-      </p:sp>
-      <p:sp>
-        <p:nvSpPr>
-          <p:cNvPr id="7" name="Title 6"/>
-          <p:cNvSpPr>
-            <a:spLocks noGrp="1"/>
-          </p:cNvSpPr>
-          <p:nvPr>
-            <p:ph type="title"/>
-          </p:nvPr>
-        </p:nvSpPr>
-        <p:spPr/>
-        <p:txBody>
-          <a:bodyPr>
-            <a:normAutofit/>
-          </a:bodyPr>
-          <a:lstStyle/>
-          <a:p>
-            <a:r>
-              <a:rPr lang="en-GB" sz="3600" dirty="0" smtClean="0">
-                <a:gradFill flip="none" rotWithShape="1">
-                  <a:gsLst>
-                    <a:gs pos="0">
-                      <a:srgbClr val="F08300"/>
-                    </a:gs>
-                    <a:gs pos="100000">
-                      <a:srgbClr val="0644A1"/>
-                    </a:gs>
-                    <a:gs pos="36000">
-                      <a:srgbClr val="E30010"/>
-                    </a:gs>
-                    <a:gs pos="80000">
-                      <a:srgbClr val="A72879"/>
-                    </a:gs>
-                  </a:gsLst>
-                  <a:lin ang="0" scaled="1"/>
-                  <a:tileRect/>
-                </a:gradFill>
-                <a:latin typeface="Sky Text"/>
-              </a:rPr>
-              <a:t> MVC</a:t>
-            </a:r>
-            <a:endParaRPr lang="en-US" sz="3600" dirty="0"/>
-          </a:p>
-        </p:txBody>
-      </p:sp>
-      <p:pic>
-        <p:nvPicPr>
-          <p:cNvPr id="5" name="Picture 4" descr="https://www.formget.com/wp-content/uploads/2014/12/Controllers-Function-content-.png"/>
-          <p:cNvPicPr>
-            <a:picLocks noChangeAspect="1" noChangeArrowheads="1"/>
-          </p:cNvPicPr>
-          <p:nvPr/>
-        </p:nvPicPr>
-        <p:blipFill>
-          <a:blip r:embed="rId3">
-            <a:extLst>
-              <a:ext uri="{28A0092B-C50C-407E-A947-70E740481C1C}">
-                <a14:useLocalDpi xmlns:a14="http://schemas.microsoft.com/office/drawing/2010/main" val="0"/>
-              </a:ext>
-            </a:extLst>
-          </a:blip>
-          <a:srcRect/>
-          <a:stretch>
-            <a:fillRect/>
-          </a:stretch>
-        </p:blipFill>
-        <p:spPr bwMode="auto">
-          <a:xfrm>
-            <a:off x="332913" y="1269546"/>
-            <a:ext cx="8478175" cy="5009795"/>
-          </a:xfrm>
-          <a:prstGeom prst="rect">
-            <a:avLst/>
-          </a:prstGeom>
-          <a:noFill/>
-          <a:extLst>
-            <a:ext uri="{909E8E84-426E-40dd-AFC4-6F175D3DCCD1}">
-              <a14:hiddenFill xmlns:a14="http://schemas.microsoft.com/office/drawing/2010/main">
-                <a:solidFill>
-                  <a:srgbClr val="FFFFFF"/>
-                </a:solidFill>
-              </a14:hiddenFill>
-            </a:ext>
-          </a:extLst>
-        </p:spPr>
-      </p:pic>
-    </p:spTree>
-    <p:extLst>
-      <p:ext uri="{BB962C8B-B14F-4D97-AF65-F5344CB8AC3E}">
-        <p14:creationId xmlns:p14="http://schemas.microsoft.com/office/powerpoint/2010/main" val="947659687"/>
-      </p:ext>
-    </p:extLst>
-  </p:cSld>
-  <p:clrMapOvr>
-    <a:masterClrMapping/>
-  </p:clrMapOvr>
-  <p:timing>
-    <p:tnLst>
-      <p:par>
-        <p:cTn xmlns:p14="http://schemas.microsoft.com/office/powerpoint/2010/main" id="1" dur="indefinite" restart="never" nodeType="tmRoot"/>
-      </p:par>
-    </p:tnLst>
-  </p:timing>
-</p:sld>
-</file>
-
-<file path=ppt/slides/slide8.xml><?xml version="1.0" encoding="utf-8"?>
-<p:sld xmlns:a="http://schemas.openxmlformats.org/drawingml/2006/main" xmlns:r="http://schemas.openxmlformats.org/officeDocument/2006/relationships" xmlns:p="http://schemas.openxmlformats.org/presentationml/2006/main">
-  <p:cSld>
-    <p:spTree>
-      <p:nvGrpSpPr>
-        <p:cNvPr id="1" name=""/>
-        <p:cNvGrpSpPr/>
-        <p:nvPr/>
-      </p:nvGrpSpPr>
-      <p:grpSpPr>
-        <a:xfrm>
-          <a:off x="0" y="0"/>
-          <a:ext cx="0" cy="0"/>
-          <a:chOff x="0" y="0"/>
-          <a:chExt cx="0" cy="0"/>
-        </a:xfrm>
-      </p:grpSpPr>
-      <p:sp>
-        <p:nvSpPr>
-          <p:cNvPr id="4" name="object 6"/>
-          <p:cNvSpPr/>
-          <p:nvPr/>
-        </p:nvSpPr>
-        <p:spPr>
-          <a:xfrm>
-            <a:off x="0" y="5076717"/>
-            <a:ext cx="8630275" cy="1781283"/>
-          </a:xfrm>
-          <a:prstGeom prst="rect">
-            <a:avLst/>
-          </a:prstGeom>
-          <a:blipFill>
-            <a:blip r:embed="rId2" cstate="print"/>
-            <a:stretch>
-              <a:fillRect/>
-            </a:stretch>
-          </a:blipFill>
-        </p:spPr>
-        <p:txBody>
-          <a:bodyPr wrap="square" lIns="0" tIns="0" rIns="0" bIns="0" rtlCol="0"/>
-          <a:lstStyle/>
-          <a:p>
-            <a:endParaRPr kern="1200"/>
-          </a:p>
-        </p:txBody>
-      </p:sp>
-      <p:sp>
-        <p:nvSpPr>
-          <p:cNvPr id="7" name="Title 6"/>
-          <p:cNvSpPr>
-            <a:spLocks noGrp="1"/>
-          </p:cNvSpPr>
-          <p:nvPr>
-            <p:ph type="title"/>
-          </p:nvPr>
-        </p:nvSpPr>
         <p:spPr>
           <a:xfrm>
             <a:off x="457200" y="274638"/>
@@ -7325,7 +6744,7 @@
           <a:lstStyle/>
           <a:p>
             <a:r>
-              <a:rPr lang="en-GB" sz="3600" dirty="0" smtClean="0">
+              <a:rPr lang="en-GB" sz="3600" dirty="0">
                 <a:gradFill flip="none" rotWithShape="1">
                   <a:gsLst>
                     <a:gs pos="0">
@@ -7385,24 +6804,17 @@
     </p:spTree>
     <p:extLst>
       <p:ext uri="{BB962C8B-B14F-4D97-AF65-F5344CB8AC3E}">
-        <p14:creationId xmlns:p14="http://schemas.microsoft.com/office/powerpoint/2010/main" val="3853213195"/>
+        <p14:creationId xmlns:p14="http://schemas.microsoft.com/office/powerpoint/2010/main" val="2504239780"/>
       </p:ext>
     </p:extLst>
   </p:cSld>
   <p:clrMapOvr>
     <a:masterClrMapping/>
   </p:clrMapOvr>
-  <p:timing>
-    <p:tnLst>
-      <p:par>
-        <p:cTn xmlns:p14="http://schemas.microsoft.com/office/powerpoint/2010/main" id="1" dur="indefinite" restart="never" nodeType="tmRoot"/>
-      </p:par>
-    </p:tnLst>
-  </p:timing>
 </p:sld>
 </file>
 
-<file path=ppt/slides/slide9.xml><?xml version="1.0" encoding="utf-8"?>
+<file path=ppt/slides/slide7.xml><?xml version="1.0" encoding="utf-8"?>
 <p:sld xmlns:a="http://schemas.openxmlformats.org/drawingml/2006/main" xmlns:r="http://schemas.openxmlformats.org/officeDocument/2006/relationships" xmlns:p="http://schemas.openxmlformats.org/presentationml/2006/main">
   <p:cSld>
     <p:spTree>
@@ -7458,6 +6870,185 @@
             <p:ph type="title"/>
           </p:nvPr>
         </p:nvSpPr>
+        <p:spPr/>
+        <p:txBody>
+          <a:bodyPr>
+            <a:normAutofit/>
+          </a:bodyPr>
+          <a:lstStyle/>
+          <a:p>
+            <a:r>
+              <a:rPr lang="en-GB" sz="3600" dirty="0">
+                <a:gradFill flip="none" rotWithShape="1">
+                  <a:gsLst>
+                    <a:gs pos="0">
+                      <a:srgbClr val="F08300"/>
+                    </a:gs>
+                    <a:gs pos="100000">
+                      <a:srgbClr val="0644A1"/>
+                    </a:gs>
+                    <a:gs pos="36000">
+                      <a:srgbClr val="E30010"/>
+                    </a:gs>
+                    <a:gs pos="80000">
+                      <a:srgbClr val="A72879"/>
+                    </a:gs>
+                  </a:gsLst>
+                  <a:lin ang="0" scaled="1"/>
+                  <a:tileRect/>
+                </a:gradFill>
+                <a:latin typeface="Sky Text"/>
+              </a:rPr>
+              <a:t>Project Prototype</a:t>
+            </a:r>
+            <a:endParaRPr lang="en-US" sz="3600" dirty="0"/>
+          </a:p>
+        </p:txBody>
+      </p:sp>
+      <p:sp>
+        <p:nvSpPr>
+          <p:cNvPr id="2" name="Content Placeholder 1"/>
+          <p:cNvSpPr>
+            <a:spLocks noGrp="1"/>
+          </p:cNvSpPr>
+          <p:nvPr>
+            <p:ph idx="1"/>
+          </p:nvPr>
+        </p:nvSpPr>
+        <p:spPr>
+          <a:xfrm>
+            <a:off x="457200" y="1417638"/>
+            <a:ext cx="8229600" cy="5377609"/>
+          </a:xfrm>
+        </p:spPr>
+        <p:txBody>
+          <a:bodyPr>
+            <a:normAutofit/>
+          </a:bodyPr>
+          <a:lstStyle/>
+          <a:p>
+            <a:pPr marL="0" indent="0">
+              <a:buNone/>
+            </a:pPr>
+            <a:r>
+              <a:rPr lang="en-GB" dirty="0"/>
+              <a:t>Before starting our project , we designed a </a:t>
+            </a:r>
+            <a:r>
+              <a:rPr lang="en-GB" dirty="0">
+                <a:hlinkClick r:id="rId3" action="ppaction://hlinkfile"/>
+              </a:rPr>
+              <a:t>prototype</a:t>
+            </a:r>
+            <a:r>
+              <a:rPr lang="en-GB" dirty="0"/>
+              <a:t> to </a:t>
+            </a:r>
+          </a:p>
+          <a:p>
+            <a:r>
+              <a:rPr lang="en-GB" dirty="0"/>
+              <a:t>Understand the requirements </a:t>
+            </a:r>
+          </a:p>
+          <a:p>
+            <a:r>
+              <a:rPr lang="en-GB" dirty="0"/>
+              <a:t>Technically understand the problem</a:t>
+            </a:r>
+          </a:p>
+          <a:p>
+            <a:r>
+              <a:rPr lang="en-GB" dirty="0"/>
+              <a:t>Find design issues early</a:t>
+            </a:r>
+          </a:p>
+          <a:p>
+            <a:r>
+              <a:rPr lang="en-GB" dirty="0"/>
+              <a:t>Set our design priorities </a:t>
+            </a:r>
+          </a:p>
+          <a:p>
+            <a:r>
+              <a:rPr lang="en-GB" dirty="0"/>
+              <a:t>Site Navigation</a:t>
+            </a:r>
+          </a:p>
+          <a:p>
+            <a:endParaRPr lang="en-GB" dirty="0"/>
+          </a:p>
+        </p:txBody>
+      </p:sp>
+    </p:spTree>
+    <p:extLst>
+      <p:ext uri="{BB962C8B-B14F-4D97-AF65-F5344CB8AC3E}">
+        <p14:creationId xmlns:p14="http://schemas.microsoft.com/office/powerpoint/2010/main" val="3718095326"/>
+      </p:ext>
+    </p:extLst>
+  </p:cSld>
+  <p:clrMapOvr>
+    <a:masterClrMapping/>
+  </p:clrMapOvr>
+</p:sld>
+</file>
+
+<file path=ppt/slides/slide8.xml><?xml version="1.0" encoding="utf-8"?>
+<p:sld xmlns:a="http://schemas.openxmlformats.org/drawingml/2006/main" xmlns:r="http://schemas.openxmlformats.org/officeDocument/2006/relationships" xmlns:p="http://schemas.openxmlformats.org/presentationml/2006/main">
+  <p:cSld>
+    <p:spTree>
+      <p:nvGrpSpPr>
+        <p:cNvPr id="1" name=""/>
+        <p:cNvGrpSpPr/>
+        <p:nvPr/>
+      </p:nvGrpSpPr>
+      <p:grpSpPr>
+        <a:xfrm>
+          <a:off x="0" y="0"/>
+          <a:ext cx="0" cy="0"/>
+          <a:chOff x="0" y="0"/>
+          <a:chExt cx="0" cy="0"/>
+        </a:xfrm>
+      </p:grpSpPr>
+      <p:sp>
+        <p:nvSpPr>
+          <p:cNvPr id="4" name="object 6"/>
+          <p:cNvSpPr/>
+          <p:nvPr/>
+        </p:nvSpPr>
+        <p:spPr>
+          <a:xfrm>
+            <a:off x="0" y="5076717"/>
+            <a:ext cx="8630275" cy="1781283"/>
+          </a:xfrm>
+          <a:prstGeom prst="rect">
+            <a:avLst/>
+          </a:prstGeom>
+          <a:blipFill>
+            <a:blip r:embed="rId2" cstate="print"/>
+            <a:stretch>
+              <a:fillRect/>
+            </a:stretch>
+          </a:blipFill>
+        </p:spPr>
+        <p:txBody>
+          <a:bodyPr wrap="square" lIns="0" tIns="0" rIns="0" bIns="0" rtlCol="0"/>
+          <a:lstStyle/>
+          <a:p>
+            <a:endParaRPr kern="1200"/>
+          </a:p>
+        </p:txBody>
+      </p:sp>
+      <p:sp>
+        <p:nvSpPr>
+          <p:cNvPr id="7" name="Title 6"/>
+          <p:cNvSpPr>
+            <a:spLocks noGrp="1"/>
+          </p:cNvSpPr>
+          <p:nvPr>
+            <p:ph type="title"/>
+          </p:nvPr>
+        </p:nvSpPr>
         <p:spPr>
           <a:xfrm>
             <a:off x="457200" y="274638"/>
@@ -7471,7 +7062,7 @@
           <a:lstStyle/>
           <a:p>
             <a:r>
-              <a:rPr lang="en-GB" sz="3600" dirty="0" smtClean="0">
+              <a:rPr lang="en-GB" sz="3600" dirty="0">
                 <a:gradFill flip="none" rotWithShape="1">
                   <a:gsLst>
                     <a:gs pos="0">
@@ -7532,13 +7123,151 @@
   <p:clrMapOvr>
     <a:masterClrMapping/>
   </p:clrMapOvr>
-  <p:timing>
-    <p:tnLst>
-      <p:par>
-        <p:cTn xmlns:p14="http://schemas.microsoft.com/office/powerpoint/2010/main" id="1" dur="indefinite" restart="never" nodeType="tmRoot"/>
-      </p:par>
-    </p:tnLst>
-  </p:timing>
+</p:sld>
+</file>
+
+<file path=ppt/slides/slide9.xml><?xml version="1.0" encoding="utf-8"?>
+<p:sld xmlns:a="http://schemas.openxmlformats.org/drawingml/2006/main" xmlns:r="http://schemas.openxmlformats.org/officeDocument/2006/relationships" xmlns:p="http://schemas.openxmlformats.org/presentationml/2006/main">
+  <p:cSld>
+    <p:spTree>
+      <p:nvGrpSpPr>
+        <p:cNvPr id="1" name=""/>
+        <p:cNvGrpSpPr/>
+        <p:nvPr/>
+      </p:nvGrpSpPr>
+      <p:grpSpPr>
+        <a:xfrm>
+          <a:off x="0" y="0"/>
+          <a:ext cx="0" cy="0"/>
+          <a:chOff x="0" y="0"/>
+          <a:chExt cx="0" cy="0"/>
+        </a:xfrm>
+      </p:grpSpPr>
+      <p:sp>
+        <p:nvSpPr>
+          <p:cNvPr id="4" name="object 6"/>
+          <p:cNvSpPr/>
+          <p:nvPr/>
+        </p:nvSpPr>
+        <p:spPr>
+          <a:xfrm>
+            <a:off x="0" y="5076717"/>
+            <a:ext cx="8630275" cy="1781283"/>
+          </a:xfrm>
+          <a:prstGeom prst="rect">
+            <a:avLst/>
+          </a:prstGeom>
+          <a:blipFill>
+            <a:blip r:embed="rId2" cstate="print"/>
+            <a:stretch>
+              <a:fillRect/>
+            </a:stretch>
+          </a:blipFill>
+        </p:spPr>
+        <p:txBody>
+          <a:bodyPr wrap="square" lIns="0" tIns="0" rIns="0" bIns="0" rtlCol="0"/>
+          <a:lstStyle/>
+          <a:p>
+            <a:endParaRPr kern="1200"/>
+          </a:p>
+        </p:txBody>
+      </p:sp>
+      <p:sp>
+        <p:nvSpPr>
+          <p:cNvPr id="7" name="Title 6"/>
+          <p:cNvSpPr>
+            <a:spLocks noGrp="1"/>
+          </p:cNvSpPr>
+          <p:nvPr>
+            <p:ph type="title"/>
+          </p:nvPr>
+        </p:nvSpPr>
+        <p:spPr/>
+        <p:txBody>
+          <a:bodyPr>
+            <a:normAutofit/>
+          </a:bodyPr>
+          <a:lstStyle/>
+          <a:p>
+            <a:r>
+              <a:rPr lang="en-GB" sz="3600" dirty="0">
+                <a:gradFill flip="none" rotWithShape="1">
+                  <a:gsLst>
+                    <a:gs pos="0">
+                      <a:srgbClr val="F08300"/>
+                    </a:gs>
+                    <a:gs pos="100000">
+                      <a:srgbClr val="0644A1"/>
+                    </a:gs>
+                    <a:gs pos="36000">
+                      <a:srgbClr val="E30010"/>
+                    </a:gs>
+                    <a:gs pos="80000">
+                      <a:srgbClr val="A72879"/>
+                    </a:gs>
+                  </a:gsLst>
+                  <a:lin ang="0" scaled="1"/>
+                  <a:tileRect/>
+                </a:gradFill>
+                <a:latin typeface="Sky Text"/>
+              </a:rPr>
+              <a:t> MVC</a:t>
+            </a:r>
+            <a:endParaRPr lang="en-US" sz="3600" dirty="0"/>
+          </a:p>
+        </p:txBody>
+      </p:sp>
+      <p:pic>
+        <p:nvPicPr>
+          <p:cNvPr id="5" name="Picture 4" descr="https://www.formget.com/wp-content/uploads/2014/12/Controllers-Function-content-.png"/>
+          <p:cNvPicPr>
+            <a:picLocks noChangeAspect="1" noChangeArrowheads="1"/>
+          </p:cNvPicPr>
+          <p:nvPr/>
+        </p:nvPicPr>
+        <p:blipFill>
+          <a:blip r:embed="rId3">
+            <a:extLst>
+              <a:ext uri="{28A0092B-C50C-407E-A947-70E740481C1C}">
+                <a14:useLocalDpi xmlns:a14="http://schemas.microsoft.com/office/drawing/2010/main" val="0"/>
+              </a:ext>
+            </a:extLst>
+          </a:blip>
+          <a:srcRect/>
+          <a:stretch>
+            <a:fillRect/>
+          </a:stretch>
+        </p:blipFill>
+        <p:spPr bwMode="auto">
+          <a:xfrm>
+            <a:off x="332913" y="1269546"/>
+            <a:ext cx="8478175" cy="5009795"/>
+          </a:xfrm>
+          <a:prstGeom prst="rect">
+            <a:avLst/>
+          </a:prstGeom>
+          <a:noFill/>
+          <a:extLst>
+            <a:ext uri="{909E8E84-426E-40dd-AFC4-6F175D3DCCD1}">
+              <a14:hiddenFill xmlns="" xmlns:a14="http://schemas.microsoft.com/office/drawing/2010/main">
+                <a:solidFill>
+                  <a:srgbClr val="FFFFFF"/>
+                </a:solidFill>
+              </a14:hiddenFill>
+            </a:ext>
+          </a:extLst>
+        </p:spPr>
+      </p:pic>
+    </p:spTree>
+    <p:extLst>
+      <p:ext uri="{BB962C8B-B14F-4D97-AF65-F5344CB8AC3E}">
+        <p14:creationId xmlns:p14="http://schemas.microsoft.com/office/powerpoint/2010/main" val="1114878232"/>
+      </p:ext>
+    </p:extLst>
+  </p:cSld>
+  <p:clrMapOvr>
+    <a:masterClrMapping/>
+  </p:clrMapOvr>
 </p:sld>
 </file>
 

</xml_diff>